<commit_message>
improvements after Roxy comments
</commit_message>
<xml_diff>
--- a/images/resources/resources.pptx
+++ b/images/resources/resources.pptx
@@ -6,6 +6,7 @@
   </p:sldMasterIdLst>
   <p:sldIdLst>
     <p:sldId id="257" r:id="rId2"/>
+    <p:sldId id="258" r:id="rId3"/>
   </p:sldIdLst>
   <p:sldSz cx="12192000" cy="6858000"/>
   <p:notesSz cx="6858000" cy="9144000"/>
@@ -259,7 +260,7 @@
           <a:p>
             <a:fld id="{9844EE4B-68D4-4DD6-916E-B6BD3677EE44}" type="datetimeFigureOut">
               <a:rPr lang="en-US" smtClean="0"/>
-              <a:t>3/24/2019</a:t>
+              <a:t>4/11/2019</a:t>
             </a:fld>
             <a:endParaRPr lang="en-US"/>
           </a:p>
@@ -457,7 +458,7 @@
           <a:p>
             <a:fld id="{9844EE4B-68D4-4DD6-916E-B6BD3677EE44}" type="datetimeFigureOut">
               <a:rPr lang="en-US" smtClean="0"/>
-              <a:t>3/24/2019</a:t>
+              <a:t>4/11/2019</a:t>
             </a:fld>
             <a:endParaRPr lang="en-US"/>
           </a:p>
@@ -665,7 +666,7 @@
           <a:p>
             <a:fld id="{9844EE4B-68D4-4DD6-916E-B6BD3677EE44}" type="datetimeFigureOut">
               <a:rPr lang="en-US" smtClean="0"/>
-              <a:t>3/24/2019</a:t>
+              <a:t>4/11/2019</a:t>
             </a:fld>
             <a:endParaRPr lang="en-US"/>
           </a:p>
@@ -863,7 +864,7 @@
           <a:p>
             <a:fld id="{9844EE4B-68D4-4DD6-916E-B6BD3677EE44}" type="datetimeFigureOut">
               <a:rPr lang="en-US" smtClean="0"/>
-              <a:t>3/24/2019</a:t>
+              <a:t>4/11/2019</a:t>
             </a:fld>
             <a:endParaRPr lang="en-US"/>
           </a:p>
@@ -1138,7 +1139,7 @@
           <a:p>
             <a:fld id="{9844EE4B-68D4-4DD6-916E-B6BD3677EE44}" type="datetimeFigureOut">
               <a:rPr lang="en-US" smtClean="0"/>
-              <a:t>3/24/2019</a:t>
+              <a:t>4/11/2019</a:t>
             </a:fld>
             <a:endParaRPr lang="en-US"/>
           </a:p>
@@ -1403,7 +1404,7 @@
           <a:p>
             <a:fld id="{9844EE4B-68D4-4DD6-916E-B6BD3677EE44}" type="datetimeFigureOut">
               <a:rPr lang="en-US" smtClean="0"/>
-              <a:t>3/24/2019</a:t>
+              <a:t>4/11/2019</a:t>
             </a:fld>
             <a:endParaRPr lang="en-US"/>
           </a:p>
@@ -1815,7 +1816,7 @@
           <a:p>
             <a:fld id="{9844EE4B-68D4-4DD6-916E-B6BD3677EE44}" type="datetimeFigureOut">
               <a:rPr lang="en-US" smtClean="0"/>
-              <a:t>3/24/2019</a:t>
+              <a:t>4/11/2019</a:t>
             </a:fld>
             <a:endParaRPr lang="en-US"/>
           </a:p>
@@ -1956,7 +1957,7 @@
           <a:p>
             <a:fld id="{9844EE4B-68D4-4DD6-916E-B6BD3677EE44}" type="datetimeFigureOut">
               <a:rPr lang="en-US" smtClean="0"/>
-              <a:t>3/24/2019</a:t>
+              <a:t>4/11/2019</a:t>
             </a:fld>
             <a:endParaRPr lang="en-US"/>
           </a:p>
@@ -2069,7 +2070,7 @@
           <a:p>
             <a:fld id="{9844EE4B-68D4-4DD6-916E-B6BD3677EE44}" type="datetimeFigureOut">
               <a:rPr lang="en-US" smtClean="0"/>
-              <a:t>3/24/2019</a:t>
+              <a:t>4/11/2019</a:t>
             </a:fld>
             <a:endParaRPr lang="en-US"/>
           </a:p>
@@ -2380,7 +2381,7 @@
           <a:p>
             <a:fld id="{9844EE4B-68D4-4DD6-916E-B6BD3677EE44}" type="datetimeFigureOut">
               <a:rPr lang="en-US" smtClean="0"/>
-              <a:t>3/24/2019</a:t>
+              <a:t>4/11/2019</a:t>
             </a:fld>
             <a:endParaRPr lang="en-US"/>
           </a:p>
@@ -2668,7 +2669,7 @@
           <a:p>
             <a:fld id="{9844EE4B-68D4-4DD6-916E-B6BD3677EE44}" type="datetimeFigureOut">
               <a:rPr lang="en-US" smtClean="0"/>
-              <a:t>3/24/2019</a:t>
+              <a:t>4/11/2019</a:t>
             </a:fld>
             <a:endParaRPr lang="en-US"/>
           </a:p>
@@ -2909,7 +2910,7 @@
           <a:p>
             <a:fld id="{9844EE4B-68D4-4DD6-916E-B6BD3677EE44}" type="datetimeFigureOut">
               <a:rPr lang="en-US" smtClean="0"/>
-              <a:t>3/24/2019</a:t>
+              <a:t>4/11/2019</a:t>
             </a:fld>
             <a:endParaRPr lang="en-US"/>
           </a:p>
@@ -3402,6 +3403,1387 @@
 </p:sld>
 </file>
 
+<file path=ppt/slides/slide2.xml><?xml version="1.0" encoding="utf-8"?>
+<p:sld xmlns:a="http://schemas.openxmlformats.org/drawingml/2006/main" xmlns:r="http://schemas.openxmlformats.org/officeDocument/2006/relationships" xmlns:p="http://schemas.openxmlformats.org/presentationml/2006/main">
+  <p:cSld>
+    <p:spTree>
+      <p:nvGrpSpPr>
+        <p:cNvPr id="1" name=""/>
+        <p:cNvGrpSpPr/>
+        <p:nvPr/>
+      </p:nvGrpSpPr>
+      <p:grpSpPr>
+        <a:xfrm>
+          <a:off x="0" y="0"/>
+          <a:ext cx="0" cy="0"/>
+          <a:chOff x="0" y="0"/>
+          <a:chExt cx="0" cy="0"/>
+        </a:xfrm>
+      </p:grpSpPr>
+      <p:sp>
+        <p:nvSpPr>
+          <p:cNvPr id="2" name="Rectangle: Rounded Corners 1">
+            <a:extLst>
+              <a:ext uri="{FF2B5EF4-FFF2-40B4-BE49-F238E27FC236}">
+                <a16:creationId xmlns:a16="http://schemas.microsoft.com/office/drawing/2014/main" id="{8851C615-16A0-4AE5-86AC-D9FCD2A4A519}"/>
+              </a:ext>
+            </a:extLst>
+          </p:cNvPr>
+          <p:cNvSpPr/>
+          <p:nvPr/>
+        </p:nvSpPr>
+        <p:spPr>
+          <a:xfrm>
+            <a:off x="245097" y="103693"/>
+            <a:ext cx="8012783" cy="2941163"/>
+          </a:xfrm>
+          <a:prstGeom prst="roundRect">
+            <a:avLst/>
+          </a:prstGeom>
+          <a:solidFill>
+            <a:schemeClr val="accent1">
+              <a:lumMod val="20000"/>
+              <a:lumOff val="80000"/>
+            </a:schemeClr>
+          </a:solidFill>
+          <a:ln w="38100"/>
+        </p:spPr>
+        <p:style>
+          <a:lnRef idx="2">
+            <a:schemeClr val="accent1">
+              <a:shade val="50000"/>
+            </a:schemeClr>
+          </a:lnRef>
+          <a:fillRef idx="1">
+            <a:schemeClr val="accent1"/>
+          </a:fillRef>
+          <a:effectRef idx="0">
+            <a:schemeClr val="accent1"/>
+          </a:effectRef>
+          <a:fontRef idx="minor">
+            <a:schemeClr val="lt1"/>
+          </a:fontRef>
+        </p:style>
+        <p:txBody>
+          <a:bodyPr rtlCol="0" anchor="ctr"/>
+          <a:lstStyle/>
+          <a:p>
+            <a:pPr algn="ctr"/>
+            <a:endParaRPr lang="en-US" dirty="0"/>
+          </a:p>
+        </p:txBody>
+      </p:sp>
+      <p:sp>
+        <p:nvSpPr>
+          <p:cNvPr id="3" name="Rectangle: Rounded Corners 2">
+            <a:extLst>
+              <a:ext uri="{FF2B5EF4-FFF2-40B4-BE49-F238E27FC236}">
+                <a16:creationId xmlns:a16="http://schemas.microsoft.com/office/drawing/2014/main" id="{B4455FCD-C079-4FC7-959F-974C71A77566}"/>
+              </a:ext>
+            </a:extLst>
+          </p:cNvPr>
+          <p:cNvSpPr/>
+          <p:nvPr/>
+        </p:nvSpPr>
+        <p:spPr>
+          <a:xfrm>
+            <a:off x="245096" y="3844556"/>
+            <a:ext cx="8012783" cy="2078617"/>
+          </a:xfrm>
+          <a:prstGeom prst="roundRect">
+            <a:avLst/>
+          </a:prstGeom>
+          <a:solidFill>
+            <a:schemeClr val="accent4">
+              <a:lumMod val="20000"/>
+              <a:lumOff val="80000"/>
+            </a:schemeClr>
+          </a:solidFill>
+          <a:ln w="38100">
+            <a:solidFill>
+              <a:schemeClr val="accent4">
+                <a:lumMod val="75000"/>
+              </a:schemeClr>
+            </a:solidFill>
+          </a:ln>
+        </p:spPr>
+        <p:style>
+          <a:lnRef idx="2">
+            <a:schemeClr val="accent1">
+              <a:shade val="50000"/>
+            </a:schemeClr>
+          </a:lnRef>
+          <a:fillRef idx="1">
+            <a:schemeClr val="accent1"/>
+          </a:fillRef>
+          <a:effectRef idx="0">
+            <a:schemeClr val="accent1"/>
+          </a:effectRef>
+          <a:fontRef idx="minor">
+            <a:schemeClr val="lt1"/>
+          </a:fontRef>
+        </p:style>
+        <p:txBody>
+          <a:bodyPr rtlCol="0" anchor="ctr"/>
+          <a:lstStyle/>
+          <a:p>
+            <a:pPr algn="ctr"/>
+            <a:endParaRPr lang="en-US"/>
+          </a:p>
+        </p:txBody>
+      </p:sp>
+      <p:sp>
+        <p:nvSpPr>
+          <p:cNvPr id="4" name="Rectangle: Rounded Corners 3">
+            <a:extLst>
+              <a:ext uri="{FF2B5EF4-FFF2-40B4-BE49-F238E27FC236}">
+                <a16:creationId xmlns:a16="http://schemas.microsoft.com/office/drawing/2014/main" id="{B7103ACA-5278-4E5B-A662-91DE26F1B318}"/>
+              </a:ext>
+            </a:extLst>
+          </p:cNvPr>
+          <p:cNvSpPr/>
+          <p:nvPr/>
+        </p:nvSpPr>
+        <p:spPr>
+          <a:xfrm>
+            <a:off x="942682" y="103693"/>
+            <a:ext cx="7315200" cy="2941163"/>
+          </a:xfrm>
+          <a:prstGeom prst="roundRect">
+            <a:avLst/>
+          </a:prstGeom>
+          <a:solidFill>
+            <a:schemeClr val="bg1"/>
+          </a:solidFill>
+          <a:ln w="38100"/>
+        </p:spPr>
+        <p:style>
+          <a:lnRef idx="2">
+            <a:schemeClr val="accent1">
+              <a:shade val="50000"/>
+            </a:schemeClr>
+          </a:lnRef>
+          <a:fillRef idx="1">
+            <a:schemeClr val="accent1"/>
+          </a:fillRef>
+          <a:effectRef idx="0">
+            <a:schemeClr val="accent1"/>
+          </a:effectRef>
+          <a:fontRef idx="minor">
+            <a:schemeClr val="lt1"/>
+          </a:fontRef>
+        </p:style>
+        <p:txBody>
+          <a:bodyPr rtlCol="0" anchor="ctr"/>
+          <a:lstStyle/>
+          <a:p>
+            <a:pPr algn="ctr"/>
+            <a:endParaRPr lang="en-US"/>
+          </a:p>
+        </p:txBody>
+      </p:sp>
+      <p:sp>
+        <p:nvSpPr>
+          <p:cNvPr id="5" name="Rectangle: Rounded Corners 4">
+            <a:extLst>
+              <a:ext uri="{FF2B5EF4-FFF2-40B4-BE49-F238E27FC236}">
+                <a16:creationId xmlns:a16="http://schemas.microsoft.com/office/drawing/2014/main" id="{D7520ACC-BF5B-4235-B42D-35C30830890C}"/>
+              </a:ext>
+            </a:extLst>
+          </p:cNvPr>
+          <p:cNvSpPr/>
+          <p:nvPr/>
+        </p:nvSpPr>
+        <p:spPr>
+          <a:xfrm>
+            <a:off x="942682" y="3855557"/>
+            <a:ext cx="7315200" cy="2067615"/>
+          </a:xfrm>
+          <a:prstGeom prst="roundRect">
+            <a:avLst/>
+          </a:prstGeom>
+          <a:solidFill>
+            <a:schemeClr val="bg1"/>
+          </a:solidFill>
+          <a:ln w="38100">
+            <a:solidFill>
+              <a:schemeClr val="accent4">
+                <a:lumMod val="75000"/>
+              </a:schemeClr>
+            </a:solidFill>
+          </a:ln>
+        </p:spPr>
+        <p:style>
+          <a:lnRef idx="2">
+            <a:schemeClr val="accent1">
+              <a:shade val="50000"/>
+            </a:schemeClr>
+          </a:lnRef>
+          <a:fillRef idx="1">
+            <a:schemeClr val="accent1"/>
+          </a:fillRef>
+          <a:effectRef idx="0">
+            <a:schemeClr val="accent1"/>
+          </a:effectRef>
+          <a:fontRef idx="minor">
+            <a:schemeClr val="lt1"/>
+          </a:fontRef>
+        </p:style>
+        <p:txBody>
+          <a:bodyPr rtlCol="0" anchor="ctr"/>
+          <a:lstStyle/>
+          <a:p>
+            <a:pPr algn="ctr"/>
+            <a:endParaRPr lang="en-US"/>
+          </a:p>
+        </p:txBody>
+      </p:sp>
+      <p:sp>
+        <p:nvSpPr>
+          <p:cNvPr id="6" name="TextBox 5">
+            <a:extLst>
+              <a:ext uri="{FF2B5EF4-FFF2-40B4-BE49-F238E27FC236}">
+                <a16:creationId xmlns:a16="http://schemas.microsoft.com/office/drawing/2014/main" id="{6565A650-90F8-4CE7-A2E3-1D9FDF46B47B}"/>
+              </a:ext>
+            </a:extLst>
+          </p:cNvPr>
+          <p:cNvSpPr txBox="1"/>
+          <p:nvPr/>
+        </p:nvSpPr>
+        <p:spPr>
+          <a:xfrm rot="16200000">
+            <a:off x="-864928" y="1251108"/>
+            <a:ext cx="2941163" cy="646331"/>
+          </a:xfrm>
+          <a:prstGeom prst="rect">
+            <a:avLst/>
+          </a:prstGeom>
+          <a:noFill/>
+        </p:spPr>
+        <p:txBody>
+          <a:bodyPr wrap="square" rtlCol="0">
+            <a:spAutoFit/>
+          </a:bodyPr>
+          <a:lstStyle/>
+          <a:p>
+            <a:pPr algn="ctr"/>
+            <a:r>
+              <a:rPr lang="en-US" sz="3600" dirty="0"/>
+              <a:t>Class</a:t>
+            </a:r>
+          </a:p>
+        </p:txBody>
+      </p:sp>
+      <p:sp>
+        <p:nvSpPr>
+          <p:cNvPr id="7" name="TextBox 6">
+            <a:extLst>
+              <a:ext uri="{FF2B5EF4-FFF2-40B4-BE49-F238E27FC236}">
+                <a16:creationId xmlns:a16="http://schemas.microsoft.com/office/drawing/2014/main" id="{CBE48B39-9985-4C8E-B5A4-B0350040ACF6}"/>
+              </a:ext>
+            </a:extLst>
+          </p:cNvPr>
+          <p:cNvSpPr txBox="1"/>
+          <p:nvPr/>
+        </p:nvSpPr>
+        <p:spPr>
+          <a:xfrm rot="16200000">
+            <a:off x="-426586" y="4555199"/>
+            <a:ext cx="2067616" cy="646331"/>
+          </a:xfrm>
+          <a:prstGeom prst="rect">
+            <a:avLst/>
+          </a:prstGeom>
+          <a:noFill/>
+        </p:spPr>
+        <p:txBody>
+          <a:bodyPr wrap="square" rtlCol="0">
+            <a:spAutoFit/>
+          </a:bodyPr>
+          <a:lstStyle/>
+          <a:p>
+            <a:pPr algn="ctr"/>
+            <a:r>
+              <a:rPr lang="en-US" sz="3600" dirty="0"/>
+              <a:t>Object</a:t>
+            </a:r>
+          </a:p>
+        </p:txBody>
+      </p:sp>
+      <p:sp>
+        <p:nvSpPr>
+          <p:cNvPr id="10" name="TextBox 9">
+            <a:extLst>
+              <a:ext uri="{FF2B5EF4-FFF2-40B4-BE49-F238E27FC236}">
+                <a16:creationId xmlns:a16="http://schemas.microsoft.com/office/drawing/2014/main" id="{CBCEC8F8-4B47-4921-8A49-BACE5793BFBF}"/>
+              </a:ext>
+            </a:extLst>
+          </p:cNvPr>
+          <p:cNvSpPr txBox="1"/>
+          <p:nvPr/>
+        </p:nvSpPr>
+        <p:spPr>
+          <a:xfrm>
+            <a:off x="1079652" y="2360609"/>
+            <a:ext cx="2194560" cy="615553"/>
+          </a:xfrm>
+          <a:prstGeom prst="rect">
+            <a:avLst/>
+          </a:prstGeom>
+          <a:noFill/>
+        </p:spPr>
+        <p:txBody>
+          <a:bodyPr wrap="square" rtlCol="0">
+            <a:spAutoFit/>
+          </a:bodyPr>
+          <a:lstStyle/>
+          <a:p>
+            <a:pPr algn="ctr"/>
+            <a:r>
+              <a:rPr lang="en-US" sz="2000" dirty="0"/>
+              <a:t>Building</a:t>
+            </a:r>
+          </a:p>
+          <a:p>
+            <a:pPr algn="ctr"/>
+            <a:r>
+              <a:rPr lang="en-US" sz="1400" i="1" dirty="0">
+                <a:solidFill>
+                  <a:schemeClr val="tx2"/>
+                </a:solidFill>
+              </a:rPr>
+              <a:t>class</a:t>
+            </a:r>
+          </a:p>
+        </p:txBody>
+      </p:sp>
+      <p:sp>
+        <p:nvSpPr>
+          <p:cNvPr id="11" name="TextBox 10">
+            <a:extLst>
+              <a:ext uri="{FF2B5EF4-FFF2-40B4-BE49-F238E27FC236}">
+                <a16:creationId xmlns:a16="http://schemas.microsoft.com/office/drawing/2014/main" id="{7953FAFF-D855-44F3-A240-325A33D14D8F}"/>
+              </a:ext>
+            </a:extLst>
+          </p:cNvPr>
+          <p:cNvSpPr txBox="1"/>
+          <p:nvPr/>
+        </p:nvSpPr>
+        <p:spPr>
+          <a:xfrm>
+            <a:off x="3493579" y="2360608"/>
+            <a:ext cx="2194560" cy="615553"/>
+          </a:xfrm>
+          <a:prstGeom prst="rect">
+            <a:avLst/>
+          </a:prstGeom>
+          <a:noFill/>
+        </p:spPr>
+        <p:txBody>
+          <a:bodyPr wrap="square" rtlCol="0">
+            <a:spAutoFit/>
+          </a:bodyPr>
+          <a:lstStyle/>
+          <a:p>
+            <a:pPr algn="ctr"/>
+            <a:r>
+              <a:rPr lang="en-US" sz="2000" dirty="0"/>
+              <a:t>Dog</a:t>
+            </a:r>
+          </a:p>
+          <a:p>
+            <a:pPr algn="ctr"/>
+            <a:r>
+              <a:rPr lang="en-US" sz="1400" i="1" dirty="0">
+                <a:solidFill>
+                  <a:schemeClr val="tx2"/>
+                </a:solidFill>
+              </a:rPr>
+              <a:t>class</a:t>
+            </a:r>
+          </a:p>
+        </p:txBody>
+      </p:sp>
+      <p:sp>
+        <p:nvSpPr>
+          <p:cNvPr id="12" name="TextBox 11">
+            <a:extLst>
+              <a:ext uri="{FF2B5EF4-FFF2-40B4-BE49-F238E27FC236}">
+                <a16:creationId xmlns:a16="http://schemas.microsoft.com/office/drawing/2014/main" id="{D14CF7D3-5D2C-4ABA-BA36-2BBB0E510751}"/>
+              </a:ext>
+            </a:extLst>
+          </p:cNvPr>
+          <p:cNvSpPr txBox="1"/>
+          <p:nvPr/>
+        </p:nvSpPr>
+        <p:spPr>
+          <a:xfrm>
+            <a:off x="5898983" y="2360608"/>
+            <a:ext cx="2194560" cy="615553"/>
+          </a:xfrm>
+          <a:prstGeom prst="rect">
+            <a:avLst/>
+          </a:prstGeom>
+          <a:noFill/>
+        </p:spPr>
+        <p:txBody>
+          <a:bodyPr wrap="square" rtlCol="0">
+            <a:spAutoFit/>
+          </a:bodyPr>
+          <a:lstStyle/>
+          <a:p>
+            <a:pPr algn="ctr"/>
+            <a:r>
+              <a:rPr lang="en-US" sz="2000" dirty="0"/>
+              <a:t>Car</a:t>
+            </a:r>
+          </a:p>
+          <a:p>
+            <a:pPr algn="ctr"/>
+            <a:r>
+              <a:rPr lang="en-US" sz="1400" i="1" dirty="0">
+                <a:solidFill>
+                  <a:schemeClr val="tx2"/>
+                </a:solidFill>
+              </a:rPr>
+              <a:t>class</a:t>
+            </a:r>
+          </a:p>
+        </p:txBody>
+      </p:sp>
+      <p:grpSp>
+        <p:nvGrpSpPr>
+          <p:cNvPr id="19" name="Group 18">
+            <a:extLst>
+              <a:ext uri="{FF2B5EF4-FFF2-40B4-BE49-F238E27FC236}">
+                <a16:creationId xmlns:a16="http://schemas.microsoft.com/office/drawing/2014/main" id="{D79993E0-2433-4757-BC55-AA016CE98F7E}"/>
+              </a:ext>
+            </a:extLst>
+          </p:cNvPr>
+          <p:cNvGrpSpPr/>
+          <p:nvPr/>
+        </p:nvGrpSpPr>
+        <p:grpSpPr>
+          <a:xfrm>
+            <a:off x="1411477" y="485925"/>
+            <a:ext cx="1630243" cy="1647479"/>
+            <a:chOff x="1260645" y="429363"/>
+            <a:chExt cx="1630243" cy="1647479"/>
+          </a:xfrm>
+        </p:grpSpPr>
+        <p:pic>
+          <p:nvPicPr>
+            <p:cNvPr id="9" name="Graphic 8" descr="Suburban scene">
+              <a:extLst>
+                <a:ext uri="{FF2B5EF4-FFF2-40B4-BE49-F238E27FC236}">
+                  <a16:creationId xmlns:a16="http://schemas.microsoft.com/office/drawing/2014/main" id="{45970AE9-BD83-4B13-91A8-D0D456424067}"/>
+                </a:ext>
+              </a:extLst>
+            </p:cNvPr>
+            <p:cNvPicPr>
+              <a:picLocks noChangeAspect="1"/>
+            </p:cNvPicPr>
+            <p:nvPr/>
+          </p:nvPicPr>
+          <p:blipFill>
+            <a:blip r:embed="rId2">
+              <a:extLst>
+                <a:ext uri="{28A0092B-C50C-407E-A947-70E740481C1C}">
+                  <a14:useLocalDpi xmlns:a14="http://schemas.microsoft.com/office/drawing/2010/main" val="0"/>
+                </a:ext>
+                <a:ext uri="{96DAC541-7B7A-43D3-8B79-37D633B846F1}">
+                  <asvg:svgBlip xmlns:asvg="http://schemas.microsoft.com/office/drawing/2016/SVG/main" r:embed="rId3"/>
+                </a:ext>
+              </a:extLst>
+            </a:blip>
+            <a:stretch>
+              <a:fillRect/>
+            </a:stretch>
+          </p:blipFill>
+          <p:spPr>
+            <a:xfrm>
+              <a:off x="1322546" y="429363"/>
+              <a:ext cx="731520" cy="731520"/>
+            </a:xfrm>
+            <a:prstGeom prst="rect">
+              <a:avLst/>
+            </a:prstGeom>
+          </p:spPr>
+        </p:pic>
+        <p:pic>
+          <p:nvPicPr>
+            <p:cNvPr id="14" name="Graphic 13" descr="Building">
+              <a:extLst>
+                <a:ext uri="{FF2B5EF4-FFF2-40B4-BE49-F238E27FC236}">
+                  <a16:creationId xmlns:a16="http://schemas.microsoft.com/office/drawing/2014/main" id="{25B06DF6-4A14-40B9-A47D-F02A5027F938}"/>
+                </a:ext>
+              </a:extLst>
+            </p:cNvPr>
+            <p:cNvPicPr>
+              <a:picLocks noChangeAspect="1"/>
+            </p:cNvPicPr>
+            <p:nvPr/>
+          </p:nvPicPr>
+          <p:blipFill>
+            <a:blip r:embed="rId4">
+              <a:extLst>
+                <a:ext uri="{28A0092B-C50C-407E-A947-70E740481C1C}">
+                  <a14:useLocalDpi xmlns:a14="http://schemas.microsoft.com/office/drawing/2010/main" val="0"/>
+                </a:ext>
+                <a:ext uri="{96DAC541-7B7A-43D3-8B79-37D633B846F1}">
+                  <asvg:svgBlip xmlns:asvg="http://schemas.microsoft.com/office/drawing/2016/SVG/main" r:embed="rId5"/>
+                </a:ext>
+              </a:extLst>
+            </a:blip>
+            <a:stretch>
+              <a:fillRect/>
+            </a:stretch>
+          </p:blipFill>
+          <p:spPr>
+            <a:xfrm>
+              <a:off x="2054066" y="1345322"/>
+              <a:ext cx="731520" cy="731520"/>
+            </a:xfrm>
+            <a:prstGeom prst="rect">
+              <a:avLst/>
+            </a:prstGeom>
+          </p:spPr>
+        </p:pic>
+        <p:pic>
+          <p:nvPicPr>
+            <p:cNvPr id="16" name="Graphic 15" descr="Schoolhouse">
+              <a:extLst>
+                <a:ext uri="{FF2B5EF4-FFF2-40B4-BE49-F238E27FC236}">
+                  <a16:creationId xmlns:a16="http://schemas.microsoft.com/office/drawing/2014/main" id="{C2B13EE3-39D7-47CB-96DD-01133872AE43}"/>
+                </a:ext>
+              </a:extLst>
+            </p:cNvPr>
+            <p:cNvPicPr>
+              <a:picLocks noChangeAspect="1"/>
+            </p:cNvPicPr>
+            <p:nvPr/>
+          </p:nvPicPr>
+          <p:blipFill>
+            <a:blip r:embed="rId6">
+              <a:extLst>
+                <a:ext uri="{28A0092B-C50C-407E-A947-70E740481C1C}">
+                  <a14:useLocalDpi xmlns:a14="http://schemas.microsoft.com/office/drawing/2010/main" val="0"/>
+                </a:ext>
+                <a:ext uri="{96DAC541-7B7A-43D3-8B79-37D633B846F1}">
+                  <asvg:svgBlip xmlns:asvg="http://schemas.microsoft.com/office/drawing/2016/SVG/main" r:embed="rId7"/>
+                </a:ext>
+              </a:extLst>
+            </a:blip>
+            <a:stretch>
+              <a:fillRect/>
+            </a:stretch>
+          </p:blipFill>
+          <p:spPr>
+            <a:xfrm>
+              <a:off x="2067928" y="437250"/>
+              <a:ext cx="822960" cy="822960"/>
+            </a:xfrm>
+            <a:prstGeom prst="rect">
+              <a:avLst/>
+            </a:prstGeom>
+          </p:spPr>
+        </p:pic>
+        <p:pic>
+          <p:nvPicPr>
+            <p:cNvPr id="18" name="Graphic 17" descr="Barn">
+              <a:extLst>
+                <a:ext uri="{FF2B5EF4-FFF2-40B4-BE49-F238E27FC236}">
+                  <a16:creationId xmlns:a16="http://schemas.microsoft.com/office/drawing/2014/main" id="{1920E4F9-BDCA-442A-A0A0-F7B986DB981B}"/>
+                </a:ext>
+              </a:extLst>
+            </p:cNvPr>
+            <p:cNvPicPr>
+              <a:picLocks noChangeAspect="1"/>
+            </p:cNvPicPr>
+            <p:nvPr/>
+          </p:nvPicPr>
+          <p:blipFill>
+            <a:blip r:embed="rId8">
+              <a:extLst>
+                <a:ext uri="{28A0092B-C50C-407E-A947-70E740481C1C}">
+                  <a14:useLocalDpi xmlns:a14="http://schemas.microsoft.com/office/drawing/2010/main" val="0"/>
+                </a:ext>
+                <a:ext uri="{96DAC541-7B7A-43D3-8B79-37D633B846F1}">
+                  <asvg:svgBlip xmlns:asvg="http://schemas.microsoft.com/office/drawing/2016/SVG/main" r:embed="rId9"/>
+                </a:ext>
+              </a:extLst>
+            </a:blip>
+            <a:stretch>
+              <a:fillRect/>
+            </a:stretch>
+          </p:blipFill>
+          <p:spPr>
+            <a:xfrm>
+              <a:off x="1260645" y="1125846"/>
+              <a:ext cx="731520" cy="731520"/>
+            </a:xfrm>
+            <a:prstGeom prst="rect">
+              <a:avLst/>
+            </a:prstGeom>
+          </p:spPr>
+        </p:pic>
+      </p:grpSp>
+      <p:sp>
+        <p:nvSpPr>
+          <p:cNvPr id="20" name="TextBox 19">
+            <a:extLst>
+              <a:ext uri="{FF2B5EF4-FFF2-40B4-BE49-F238E27FC236}">
+                <a16:creationId xmlns:a16="http://schemas.microsoft.com/office/drawing/2014/main" id="{33A0A46A-401C-4DC1-9B89-517B8259E674}"/>
+              </a:ext>
+            </a:extLst>
+          </p:cNvPr>
+          <p:cNvSpPr txBox="1"/>
+          <p:nvPr/>
+        </p:nvSpPr>
+        <p:spPr>
+          <a:xfrm>
+            <a:off x="1045717" y="5295300"/>
+            <a:ext cx="2194560" cy="615553"/>
+          </a:xfrm>
+          <a:prstGeom prst="rect">
+            <a:avLst/>
+          </a:prstGeom>
+          <a:noFill/>
+        </p:spPr>
+        <p:txBody>
+          <a:bodyPr wrap="square" rtlCol="0">
+            <a:spAutoFit/>
+          </a:bodyPr>
+          <a:lstStyle/>
+          <a:p>
+            <a:pPr algn="ctr"/>
+            <a:r>
+              <a:rPr lang="en-US" sz="2000" dirty="0"/>
+              <a:t>The White House</a:t>
+            </a:r>
+          </a:p>
+          <a:p>
+            <a:pPr algn="ctr"/>
+            <a:r>
+              <a:rPr lang="en-US" sz="1400" i="1" dirty="0">
+                <a:solidFill>
+                  <a:schemeClr val="accent4">
+                    <a:lumMod val="75000"/>
+                  </a:schemeClr>
+                </a:solidFill>
+              </a:rPr>
+              <a:t>instance of </a:t>
+            </a:r>
+            <a:r>
+              <a:rPr lang="en-US" sz="1400" i="1" dirty="0">
+                <a:solidFill>
+                  <a:schemeClr val="accent1">
+                    <a:lumMod val="50000"/>
+                  </a:schemeClr>
+                </a:solidFill>
+              </a:rPr>
+              <a:t>Building</a:t>
+            </a:r>
+          </a:p>
+        </p:txBody>
+      </p:sp>
+      <p:pic>
+        <p:nvPicPr>
+          <p:cNvPr id="22" name="Picture 21">
+            <a:extLst>
+              <a:ext uri="{FF2B5EF4-FFF2-40B4-BE49-F238E27FC236}">
+                <a16:creationId xmlns:a16="http://schemas.microsoft.com/office/drawing/2014/main" id="{D393D77A-3465-468C-887A-5D04FD8A40AD}"/>
+              </a:ext>
+            </a:extLst>
+          </p:cNvPr>
+          <p:cNvPicPr>
+            <a:picLocks noChangeAspect="1"/>
+          </p:cNvPicPr>
+          <p:nvPr/>
+        </p:nvPicPr>
+        <p:blipFill rotWithShape="1">
+          <a:blip r:embed="rId10">
+            <a:extLst>
+              <a:ext uri="{28A0092B-C50C-407E-A947-70E740481C1C}">
+                <a14:useLocalDpi xmlns:a14="http://schemas.microsoft.com/office/drawing/2010/main" val="0"/>
+              </a:ext>
+            </a:extLst>
+          </a:blip>
+          <a:srcRect t="25568" b="26536"/>
+          <a:stretch/>
+        </p:blipFill>
+        <p:spPr>
+          <a:xfrm>
+            <a:off x="1228597" y="4223203"/>
+            <a:ext cx="1828800" cy="981046"/>
+          </a:xfrm>
+          <a:prstGeom prst="rect">
+            <a:avLst/>
+          </a:prstGeom>
+        </p:spPr>
+      </p:pic>
+      <p:sp>
+        <p:nvSpPr>
+          <p:cNvPr id="28" name="TextBox 27">
+            <a:extLst>
+              <a:ext uri="{FF2B5EF4-FFF2-40B4-BE49-F238E27FC236}">
+                <a16:creationId xmlns:a16="http://schemas.microsoft.com/office/drawing/2014/main" id="{7C966585-37B7-4E2D-9464-4D57DB94D6DA}"/>
+              </a:ext>
+            </a:extLst>
+          </p:cNvPr>
+          <p:cNvSpPr txBox="1"/>
+          <p:nvPr/>
+        </p:nvSpPr>
+        <p:spPr>
+          <a:xfrm>
+            <a:off x="3493579" y="5294313"/>
+            <a:ext cx="2194560" cy="615553"/>
+          </a:xfrm>
+          <a:prstGeom prst="rect">
+            <a:avLst/>
+          </a:prstGeom>
+          <a:noFill/>
+        </p:spPr>
+        <p:txBody>
+          <a:bodyPr wrap="square" rtlCol="0">
+            <a:spAutoFit/>
+          </a:bodyPr>
+          <a:lstStyle/>
+          <a:p>
+            <a:pPr algn="ctr"/>
+            <a:r>
+              <a:rPr lang="en-US" sz="2000" dirty="0"/>
+              <a:t>Lassie</a:t>
+            </a:r>
+          </a:p>
+          <a:p>
+            <a:pPr algn="ctr"/>
+            <a:r>
+              <a:rPr lang="en-US" sz="1400" i="1" dirty="0">
+                <a:solidFill>
+                  <a:schemeClr val="accent4">
+                    <a:lumMod val="75000"/>
+                  </a:schemeClr>
+                </a:solidFill>
+              </a:rPr>
+              <a:t>instance of </a:t>
+            </a:r>
+            <a:r>
+              <a:rPr lang="en-US" sz="1400" i="1" dirty="0">
+                <a:solidFill>
+                  <a:schemeClr val="accent1">
+                    <a:lumMod val="50000"/>
+                  </a:schemeClr>
+                </a:solidFill>
+              </a:rPr>
+              <a:t>Dog</a:t>
+            </a:r>
+          </a:p>
+        </p:txBody>
+      </p:sp>
+      <p:pic>
+        <p:nvPicPr>
+          <p:cNvPr id="30" name="Picture 29">
+            <a:extLst>
+              <a:ext uri="{FF2B5EF4-FFF2-40B4-BE49-F238E27FC236}">
+                <a16:creationId xmlns:a16="http://schemas.microsoft.com/office/drawing/2014/main" id="{A0E84721-264B-4C69-B5C7-1705B2B2321B}"/>
+              </a:ext>
+            </a:extLst>
+          </p:cNvPr>
+          <p:cNvPicPr>
+            <a:picLocks noChangeAspect="1"/>
+          </p:cNvPicPr>
+          <p:nvPr/>
+        </p:nvPicPr>
+        <p:blipFill>
+          <a:blip r:embed="rId11">
+            <a:extLst>
+              <a:ext uri="{28A0092B-C50C-407E-A947-70E740481C1C}">
+                <a14:useLocalDpi xmlns:a14="http://schemas.microsoft.com/office/drawing/2010/main" val="0"/>
+              </a:ext>
+            </a:extLst>
+          </a:blip>
+          <a:stretch>
+            <a:fillRect/>
+          </a:stretch>
+        </p:blipFill>
+        <p:spPr>
+          <a:xfrm>
+            <a:off x="4006053" y="4257401"/>
+            <a:ext cx="1137494" cy="822960"/>
+          </a:xfrm>
+          <a:prstGeom prst="rect">
+            <a:avLst/>
+          </a:prstGeom>
+        </p:spPr>
+      </p:pic>
+      <p:grpSp>
+        <p:nvGrpSpPr>
+          <p:cNvPr id="35" name="Group 34">
+            <a:extLst>
+              <a:ext uri="{FF2B5EF4-FFF2-40B4-BE49-F238E27FC236}">
+                <a16:creationId xmlns:a16="http://schemas.microsoft.com/office/drawing/2014/main" id="{F61D3812-BDCE-4787-9F86-86847A199E35}"/>
+              </a:ext>
+            </a:extLst>
+          </p:cNvPr>
+          <p:cNvGrpSpPr/>
+          <p:nvPr/>
+        </p:nvGrpSpPr>
+        <p:grpSpPr>
+          <a:xfrm>
+            <a:off x="3743042" y="402593"/>
+            <a:ext cx="1903564" cy="1796264"/>
+            <a:chOff x="3450805" y="317751"/>
+            <a:chExt cx="1903564" cy="1796264"/>
+          </a:xfrm>
+        </p:grpSpPr>
+        <p:pic>
+          <p:nvPicPr>
+            <p:cNvPr id="24" name="Graphic 23" descr="Dog">
+              <a:extLst>
+                <a:ext uri="{FF2B5EF4-FFF2-40B4-BE49-F238E27FC236}">
+                  <a16:creationId xmlns:a16="http://schemas.microsoft.com/office/drawing/2014/main" id="{80EE78B9-76E7-45BD-8FC9-D7C0DB50875C}"/>
+                </a:ext>
+              </a:extLst>
+            </p:cNvPr>
+            <p:cNvPicPr>
+              <a:picLocks noChangeAspect="1"/>
+            </p:cNvPicPr>
+            <p:nvPr/>
+          </p:nvPicPr>
+          <p:blipFill>
+            <a:blip r:embed="rId12">
+              <a:extLst>
+                <a:ext uri="{28A0092B-C50C-407E-A947-70E740481C1C}">
+                  <a14:useLocalDpi xmlns:a14="http://schemas.microsoft.com/office/drawing/2010/main" val="0"/>
+                </a:ext>
+                <a:ext uri="{96DAC541-7B7A-43D3-8B79-37D633B846F1}">
+                  <asvg:svgBlip xmlns:asvg="http://schemas.microsoft.com/office/drawing/2016/SVG/main" r:embed="rId13"/>
+                </a:ext>
+              </a:extLst>
+            </a:blip>
+            <a:stretch>
+              <a:fillRect/>
+            </a:stretch>
+          </p:blipFill>
+          <p:spPr>
+            <a:xfrm>
+              <a:off x="3450805" y="317751"/>
+              <a:ext cx="822960" cy="822960"/>
+            </a:xfrm>
+            <a:prstGeom prst="rect">
+              <a:avLst/>
+            </a:prstGeom>
+          </p:spPr>
+        </p:pic>
+        <p:pic>
+          <p:nvPicPr>
+            <p:cNvPr id="25" name="Graphic 24" descr="Dog">
+              <a:extLst>
+                <a:ext uri="{FF2B5EF4-FFF2-40B4-BE49-F238E27FC236}">
+                  <a16:creationId xmlns:a16="http://schemas.microsoft.com/office/drawing/2014/main" id="{E277DBD5-583A-4821-A09A-4932B910F98E}"/>
+                </a:ext>
+              </a:extLst>
+            </p:cNvPr>
+            <p:cNvPicPr>
+              <a:picLocks noChangeAspect="1"/>
+            </p:cNvPicPr>
+            <p:nvPr/>
+          </p:nvPicPr>
+          <p:blipFill>
+            <a:blip r:embed="rId12">
+              <a:extLst>
+                <a:ext uri="{28A0092B-C50C-407E-A947-70E740481C1C}">
+                  <a14:useLocalDpi xmlns:a14="http://schemas.microsoft.com/office/drawing/2010/main" val="0"/>
+                </a:ext>
+                <a:ext uri="{96DAC541-7B7A-43D3-8B79-37D633B846F1}">
+                  <asvg:svgBlip xmlns:asvg="http://schemas.microsoft.com/office/drawing/2016/SVG/main" r:embed="rId13"/>
+                </a:ext>
+              </a:extLst>
+            </a:blip>
+            <a:stretch>
+              <a:fillRect/>
+            </a:stretch>
+          </p:blipFill>
+          <p:spPr>
+            <a:xfrm flipH="1">
+              <a:off x="4363042" y="669303"/>
+              <a:ext cx="722583" cy="543993"/>
+            </a:xfrm>
+            <a:prstGeom prst="rect">
+              <a:avLst/>
+            </a:prstGeom>
+          </p:spPr>
+        </p:pic>
+        <p:pic>
+          <p:nvPicPr>
+            <p:cNvPr id="32" name="Picture 31">
+              <a:extLst>
+                <a:ext uri="{FF2B5EF4-FFF2-40B4-BE49-F238E27FC236}">
+                  <a16:creationId xmlns:a16="http://schemas.microsoft.com/office/drawing/2014/main" id="{9D3E99AF-AF66-476B-BD97-86038AAB6F56}"/>
+                </a:ext>
+              </a:extLst>
+            </p:cNvPr>
+            <p:cNvPicPr>
+              <a:picLocks noChangeAspect="1"/>
+            </p:cNvPicPr>
+            <p:nvPr/>
+          </p:nvPicPr>
+          <p:blipFill>
+            <a:blip r:embed="rId14">
+              <a:extLst>
+                <a:ext uri="{28A0092B-C50C-407E-A947-70E740481C1C}">
+                  <a14:useLocalDpi xmlns:a14="http://schemas.microsoft.com/office/drawing/2010/main" val="0"/>
+                </a:ext>
+              </a:extLst>
+            </a:blip>
+            <a:stretch>
+              <a:fillRect/>
+            </a:stretch>
+          </p:blipFill>
+          <p:spPr>
+            <a:xfrm>
+              <a:off x="3508994" y="1255977"/>
+              <a:ext cx="706581" cy="548640"/>
+            </a:xfrm>
+            <a:prstGeom prst="rect">
+              <a:avLst/>
+            </a:prstGeom>
+          </p:spPr>
+        </p:pic>
+        <p:pic>
+          <p:nvPicPr>
+            <p:cNvPr id="34" name="Picture 33">
+              <a:extLst>
+                <a:ext uri="{FF2B5EF4-FFF2-40B4-BE49-F238E27FC236}">
+                  <a16:creationId xmlns:a16="http://schemas.microsoft.com/office/drawing/2014/main" id="{019BC480-08FA-447C-B6FC-C43635BED6B6}"/>
+                </a:ext>
+              </a:extLst>
+            </p:cNvPr>
+            <p:cNvPicPr>
+              <a:picLocks noChangeAspect="1"/>
+            </p:cNvPicPr>
+            <p:nvPr/>
+          </p:nvPicPr>
+          <p:blipFill>
+            <a:blip r:embed="rId15">
+              <a:extLst>
+                <a:ext uri="{28A0092B-C50C-407E-A947-70E740481C1C}">
+                  <a14:useLocalDpi xmlns:a14="http://schemas.microsoft.com/office/drawing/2010/main" val="0"/>
+                </a:ext>
+              </a:extLst>
+            </a:blip>
+            <a:stretch>
+              <a:fillRect/>
+            </a:stretch>
+          </p:blipFill>
+          <p:spPr>
+            <a:xfrm>
+              <a:off x="4074208" y="1199615"/>
+              <a:ext cx="1280161" cy="914400"/>
+            </a:xfrm>
+            <a:prstGeom prst="rect">
+              <a:avLst/>
+            </a:prstGeom>
+          </p:spPr>
+        </p:pic>
+      </p:grpSp>
+      <p:pic>
+        <p:nvPicPr>
+          <p:cNvPr id="37" name="Picture 36">
+            <a:extLst>
+              <a:ext uri="{FF2B5EF4-FFF2-40B4-BE49-F238E27FC236}">
+                <a16:creationId xmlns:a16="http://schemas.microsoft.com/office/drawing/2014/main" id="{524721E6-0C22-4730-BCE9-8EFB46E646A7}"/>
+              </a:ext>
+            </a:extLst>
+          </p:cNvPr>
+          <p:cNvPicPr>
+            <a:picLocks noChangeAspect="1"/>
+          </p:cNvPicPr>
+          <p:nvPr/>
+        </p:nvPicPr>
+        <p:blipFill>
+          <a:blip r:embed="rId16">
+            <a:extLst>
+              <a:ext uri="{28A0092B-C50C-407E-A947-70E740481C1C}">
+                <a14:useLocalDpi xmlns:a14="http://schemas.microsoft.com/office/drawing/2010/main" val="0"/>
+              </a:ext>
+            </a:extLst>
+          </a:blip>
+          <a:stretch>
+            <a:fillRect/>
+          </a:stretch>
+        </p:blipFill>
+        <p:spPr>
+          <a:xfrm>
+            <a:off x="6045202" y="485961"/>
+            <a:ext cx="975360" cy="548640"/>
+          </a:xfrm>
+          <a:prstGeom prst="rect">
+            <a:avLst/>
+          </a:prstGeom>
+        </p:spPr>
+      </p:pic>
+      <p:pic>
+        <p:nvPicPr>
+          <p:cNvPr id="41" name="Picture 40">
+            <a:extLst>
+              <a:ext uri="{FF2B5EF4-FFF2-40B4-BE49-F238E27FC236}">
+                <a16:creationId xmlns:a16="http://schemas.microsoft.com/office/drawing/2014/main" id="{E3F955DD-4EDF-4AAE-B6A0-C2A9D41F4443}"/>
+              </a:ext>
+            </a:extLst>
+          </p:cNvPr>
+          <p:cNvPicPr>
+            <a:picLocks noChangeAspect="1"/>
+          </p:cNvPicPr>
+          <p:nvPr/>
+        </p:nvPicPr>
+        <p:blipFill>
+          <a:blip r:embed="rId17">
+            <a:extLst>
+              <a:ext uri="{28A0092B-C50C-407E-A947-70E740481C1C}">
+                <a14:useLocalDpi xmlns:a14="http://schemas.microsoft.com/office/drawing/2010/main" val="0"/>
+              </a:ext>
+            </a:extLst>
+          </a:blip>
+          <a:stretch>
+            <a:fillRect/>
+          </a:stretch>
+        </p:blipFill>
+        <p:spPr>
+          <a:xfrm>
+            <a:off x="6038077" y="1305997"/>
+            <a:ext cx="914400" cy="457200"/>
+          </a:xfrm>
+          <a:prstGeom prst="rect">
+            <a:avLst/>
+          </a:prstGeom>
+        </p:spPr>
+      </p:pic>
+      <p:pic>
+        <p:nvPicPr>
+          <p:cNvPr id="43" name="Graphic 42">
+            <a:extLst>
+              <a:ext uri="{FF2B5EF4-FFF2-40B4-BE49-F238E27FC236}">
+                <a16:creationId xmlns:a16="http://schemas.microsoft.com/office/drawing/2014/main" id="{4F3670F6-7A29-4C4C-8BED-DE7CB5F21189}"/>
+              </a:ext>
+            </a:extLst>
+          </p:cNvPr>
+          <p:cNvPicPr>
+            <a:picLocks noChangeAspect="1"/>
+          </p:cNvPicPr>
+          <p:nvPr/>
+        </p:nvPicPr>
+        <p:blipFill>
+          <a:blip r:embed="rId18">
+            <a:extLst>
+              <a:ext uri="{28A0092B-C50C-407E-A947-70E740481C1C}">
+                <a14:useLocalDpi xmlns:a14="http://schemas.microsoft.com/office/drawing/2010/main" val="0"/>
+              </a:ext>
+              <a:ext uri="{96DAC541-7B7A-43D3-8B79-37D633B846F1}">
+                <asvg:svgBlip xmlns:asvg="http://schemas.microsoft.com/office/drawing/2016/SVG/main" r:embed="rId19"/>
+              </a:ext>
+            </a:extLst>
+          </a:blip>
+          <a:stretch>
+            <a:fillRect/>
+          </a:stretch>
+        </p:blipFill>
+        <p:spPr>
+          <a:xfrm flipH="1">
+            <a:off x="6575382" y="1376161"/>
+            <a:ext cx="1417485" cy="914400"/>
+          </a:xfrm>
+          <a:prstGeom prst="rect">
+            <a:avLst/>
+          </a:prstGeom>
+        </p:spPr>
+      </p:pic>
+      <p:pic>
+        <p:nvPicPr>
+          <p:cNvPr id="39" name="Picture 38">
+            <a:extLst>
+              <a:ext uri="{FF2B5EF4-FFF2-40B4-BE49-F238E27FC236}">
+                <a16:creationId xmlns:a16="http://schemas.microsoft.com/office/drawing/2014/main" id="{D7AC9B85-BDD7-45D2-8125-FE052C70168D}"/>
+              </a:ext>
+            </a:extLst>
+          </p:cNvPr>
+          <p:cNvPicPr>
+            <a:picLocks noChangeAspect="1"/>
+          </p:cNvPicPr>
+          <p:nvPr/>
+        </p:nvPicPr>
+        <p:blipFill>
+          <a:blip r:embed="rId20">
+            <a:extLst>
+              <a:ext uri="{28A0092B-C50C-407E-A947-70E740481C1C}">
+                <a14:useLocalDpi xmlns:a14="http://schemas.microsoft.com/office/drawing/2010/main" val="0"/>
+              </a:ext>
+            </a:extLst>
+          </a:blip>
+          <a:stretch>
+            <a:fillRect/>
+          </a:stretch>
+        </p:blipFill>
+        <p:spPr>
+          <a:xfrm flipH="1">
+            <a:off x="6573331" y="651207"/>
+            <a:ext cx="1369660" cy="1005840"/>
+          </a:xfrm>
+          <a:prstGeom prst="rect">
+            <a:avLst/>
+          </a:prstGeom>
+        </p:spPr>
+      </p:pic>
+      <p:sp>
+        <p:nvSpPr>
+          <p:cNvPr id="44" name="TextBox 43">
+            <a:extLst>
+              <a:ext uri="{FF2B5EF4-FFF2-40B4-BE49-F238E27FC236}">
+                <a16:creationId xmlns:a16="http://schemas.microsoft.com/office/drawing/2014/main" id="{E11E59AF-9A7C-402C-B8B0-3F3312C64C2A}"/>
+              </a:ext>
+            </a:extLst>
+          </p:cNvPr>
+          <p:cNvSpPr txBox="1"/>
+          <p:nvPr/>
+        </p:nvSpPr>
+        <p:spPr>
+          <a:xfrm>
+            <a:off x="5841133" y="5315469"/>
+            <a:ext cx="2194560" cy="615553"/>
+          </a:xfrm>
+          <a:prstGeom prst="rect">
+            <a:avLst/>
+          </a:prstGeom>
+          <a:noFill/>
+        </p:spPr>
+        <p:txBody>
+          <a:bodyPr wrap="square" rtlCol="0">
+            <a:spAutoFit/>
+          </a:bodyPr>
+          <a:lstStyle/>
+          <a:p>
+            <a:pPr algn="ctr"/>
+            <a:r>
+              <a:rPr lang="en-US" sz="2000" dirty="0"/>
+              <a:t>Your car</a:t>
+            </a:r>
+          </a:p>
+          <a:p>
+            <a:pPr algn="ctr"/>
+            <a:r>
+              <a:rPr lang="en-US" sz="1400" i="1" dirty="0">
+                <a:solidFill>
+                  <a:schemeClr val="accent4">
+                    <a:lumMod val="75000"/>
+                  </a:schemeClr>
+                </a:solidFill>
+              </a:rPr>
+              <a:t>instance of </a:t>
+            </a:r>
+            <a:r>
+              <a:rPr lang="en-US" sz="1400" i="1" dirty="0">
+                <a:solidFill>
+                  <a:schemeClr val="accent1">
+                    <a:lumMod val="50000"/>
+                  </a:schemeClr>
+                </a:solidFill>
+              </a:rPr>
+              <a:t>Car</a:t>
+            </a:r>
+          </a:p>
+        </p:txBody>
+      </p:sp>
+      <p:pic>
+        <p:nvPicPr>
+          <p:cNvPr id="47" name="Picture 46">
+            <a:extLst>
+              <a:ext uri="{FF2B5EF4-FFF2-40B4-BE49-F238E27FC236}">
+                <a16:creationId xmlns:a16="http://schemas.microsoft.com/office/drawing/2014/main" id="{4AA58880-BB3A-41C1-A0A6-06A2750087DF}"/>
+              </a:ext>
+            </a:extLst>
+          </p:cNvPr>
+          <p:cNvPicPr>
+            <a:picLocks noChangeAspect="1"/>
+          </p:cNvPicPr>
+          <p:nvPr/>
+        </p:nvPicPr>
+        <p:blipFill>
+          <a:blip r:embed="rId21">
+            <a:extLst>
+              <a:ext uri="{28A0092B-C50C-407E-A947-70E740481C1C}">
+                <a14:useLocalDpi xmlns:a14="http://schemas.microsoft.com/office/drawing/2010/main" val="0"/>
+              </a:ext>
+            </a:extLst>
+          </a:blip>
+          <a:stretch>
+            <a:fillRect/>
+          </a:stretch>
+        </p:blipFill>
+        <p:spPr>
+          <a:xfrm>
+            <a:off x="6448554" y="4304096"/>
+            <a:ext cx="979718" cy="822960"/>
+          </a:xfrm>
+          <a:prstGeom prst="rect">
+            <a:avLst/>
+          </a:prstGeom>
+        </p:spPr>
+      </p:pic>
+      <p:sp>
+        <p:nvSpPr>
+          <p:cNvPr id="48" name="Arrow: Down 47">
+            <a:extLst>
+              <a:ext uri="{FF2B5EF4-FFF2-40B4-BE49-F238E27FC236}">
+                <a16:creationId xmlns:a16="http://schemas.microsoft.com/office/drawing/2014/main" id="{B1F4F759-355D-42F5-81FC-78CEB3ABCA21}"/>
+              </a:ext>
+            </a:extLst>
+          </p:cNvPr>
+          <p:cNvSpPr/>
+          <p:nvPr/>
+        </p:nvSpPr>
+        <p:spPr>
+          <a:xfrm>
+            <a:off x="1618550" y="3167406"/>
+            <a:ext cx="1097280" cy="548640"/>
+          </a:xfrm>
+          <a:prstGeom prst="downArrow">
+            <a:avLst/>
+          </a:prstGeom>
+          <a:noFill/>
+        </p:spPr>
+        <p:style>
+          <a:lnRef idx="2">
+            <a:schemeClr val="accent3">
+              <a:shade val="50000"/>
+            </a:schemeClr>
+          </a:lnRef>
+          <a:fillRef idx="1">
+            <a:schemeClr val="accent3"/>
+          </a:fillRef>
+          <a:effectRef idx="0">
+            <a:schemeClr val="accent3"/>
+          </a:effectRef>
+          <a:fontRef idx="minor">
+            <a:schemeClr val="lt1"/>
+          </a:fontRef>
+        </p:style>
+        <p:txBody>
+          <a:bodyPr rtlCol="0" anchor="ctr"/>
+          <a:lstStyle/>
+          <a:p>
+            <a:pPr algn="ctr"/>
+            <a:endParaRPr lang="en-US"/>
+          </a:p>
+        </p:txBody>
+      </p:sp>
+      <p:sp>
+        <p:nvSpPr>
+          <p:cNvPr id="49" name="Arrow: Down 48">
+            <a:extLst>
+              <a:ext uri="{FF2B5EF4-FFF2-40B4-BE49-F238E27FC236}">
+                <a16:creationId xmlns:a16="http://schemas.microsoft.com/office/drawing/2014/main" id="{44B57A4D-77BA-46D1-971F-A3200BACD56F}"/>
+              </a:ext>
+            </a:extLst>
+          </p:cNvPr>
+          <p:cNvSpPr/>
+          <p:nvPr/>
+        </p:nvSpPr>
+        <p:spPr>
+          <a:xfrm>
+            <a:off x="4034334" y="3167406"/>
+            <a:ext cx="1097280" cy="548640"/>
+          </a:xfrm>
+          <a:prstGeom prst="downArrow">
+            <a:avLst/>
+          </a:prstGeom>
+          <a:noFill/>
+        </p:spPr>
+        <p:style>
+          <a:lnRef idx="2">
+            <a:schemeClr val="accent3">
+              <a:shade val="50000"/>
+            </a:schemeClr>
+          </a:lnRef>
+          <a:fillRef idx="1">
+            <a:schemeClr val="accent3"/>
+          </a:fillRef>
+          <a:effectRef idx="0">
+            <a:schemeClr val="accent3"/>
+          </a:effectRef>
+          <a:fontRef idx="minor">
+            <a:schemeClr val="lt1"/>
+          </a:fontRef>
+        </p:style>
+        <p:txBody>
+          <a:bodyPr rtlCol="0" anchor="ctr"/>
+          <a:lstStyle/>
+          <a:p>
+            <a:pPr algn="ctr"/>
+            <a:endParaRPr lang="en-US"/>
+          </a:p>
+        </p:txBody>
+      </p:sp>
+      <p:sp>
+        <p:nvSpPr>
+          <p:cNvPr id="50" name="Arrow: Down 49">
+            <a:extLst>
+              <a:ext uri="{FF2B5EF4-FFF2-40B4-BE49-F238E27FC236}">
+                <a16:creationId xmlns:a16="http://schemas.microsoft.com/office/drawing/2014/main" id="{7F021542-41AF-4FAE-9679-2543E64EFBA8}"/>
+              </a:ext>
+            </a:extLst>
+          </p:cNvPr>
+          <p:cNvSpPr/>
+          <p:nvPr/>
+        </p:nvSpPr>
+        <p:spPr>
+          <a:xfrm>
+            <a:off x="6432118" y="3167406"/>
+            <a:ext cx="1097280" cy="548640"/>
+          </a:xfrm>
+          <a:prstGeom prst="downArrow">
+            <a:avLst/>
+          </a:prstGeom>
+          <a:noFill/>
+        </p:spPr>
+        <p:style>
+          <a:lnRef idx="2">
+            <a:schemeClr val="accent3">
+              <a:shade val="50000"/>
+            </a:schemeClr>
+          </a:lnRef>
+          <a:fillRef idx="1">
+            <a:schemeClr val="accent3"/>
+          </a:fillRef>
+          <a:effectRef idx="0">
+            <a:schemeClr val="accent3"/>
+          </a:effectRef>
+          <a:fontRef idx="minor">
+            <a:schemeClr val="lt1"/>
+          </a:fontRef>
+        </p:style>
+        <p:txBody>
+          <a:bodyPr rtlCol="0" anchor="ctr"/>
+          <a:lstStyle/>
+          <a:p>
+            <a:pPr algn="ctr"/>
+            <a:endParaRPr lang="en-US"/>
+          </a:p>
+        </p:txBody>
+      </p:sp>
+    </p:spTree>
+    <p:extLst>
+      <p:ext uri="{BB962C8B-B14F-4D97-AF65-F5344CB8AC3E}">
+        <p14:creationId xmlns:p14="http://schemas.microsoft.com/office/powerpoint/2010/main" val="2628875378"/>
+      </p:ext>
+    </p:extLst>
+  </p:cSld>
+  <p:clrMapOvr>
+    <a:masterClrMapping/>
+  </p:clrMapOvr>
+</p:sld>
+</file>
+
 <file path=ppt/theme/theme1.xml><?xml version="1.0" encoding="utf-8"?>
 <a:theme xmlns:a="http://schemas.openxmlformats.org/drawingml/2006/main" name="Office Theme">
   <a:themeElements>

</xml_diff>

<commit_message>
changes after OOP review
</commit_message>
<xml_diff>
--- a/images/resources/resources.pptx
+++ b/images/resources/resources.pptx
@@ -7,6 +7,7 @@
   <p:sldIdLst>
     <p:sldId id="257" r:id="rId2"/>
     <p:sldId id="258" r:id="rId3"/>
+    <p:sldId id="259" r:id="rId4"/>
   </p:sldIdLst>
   <p:sldSz cx="12192000" cy="6858000"/>
   <p:notesSz cx="6858000" cy="9144000"/>
@@ -260,7 +261,7 @@
           <a:p>
             <a:fld id="{9844EE4B-68D4-4DD6-916E-B6BD3677EE44}" type="datetimeFigureOut">
               <a:rPr lang="en-US" smtClean="0"/>
-              <a:t>4/11/2019</a:t>
+              <a:t>4/19/2019</a:t>
             </a:fld>
             <a:endParaRPr lang="en-US"/>
           </a:p>
@@ -458,7 +459,7 @@
           <a:p>
             <a:fld id="{9844EE4B-68D4-4DD6-916E-B6BD3677EE44}" type="datetimeFigureOut">
               <a:rPr lang="en-US" smtClean="0"/>
-              <a:t>4/11/2019</a:t>
+              <a:t>4/19/2019</a:t>
             </a:fld>
             <a:endParaRPr lang="en-US"/>
           </a:p>
@@ -666,7 +667,7 @@
           <a:p>
             <a:fld id="{9844EE4B-68D4-4DD6-916E-B6BD3677EE44}" type="datetimeFigureOut">
               <a:rPr lang="en-US" smtClean="0"/>
-              <a:t>4/11/2019</a:t>
+              <a:t>4/19/2019</a:t>
             </a:fld>
             <a:endParaRPr lang="en-US"/>
           </a:p>
@@ -864,7 +865,7 @@
           <a:p>
             <a:fld id="{9844EE4B-68D4-4DD6-916E-B6BD3677EE44}" type="datetimeFigureOut">
               <a:rPr lang="en-US" smtClean="0"/>
-              <a:t>4/11/2019</a:t>
+              <a:t>4/19/2019</a:t>
             </a:fld>
             <a:endParaRPr lang="en-US"/>
           </a:p>
@@ -1139,7 +1140,7 @@
           <a:p>
             <a:fld id="{9844EE4B-68D4-4DD6-916E-B6BD3677EE44}" type="datetimeFigureOut">
               <a:rPr lang="en-US" smtClean="0"/>
-              <a:t>4/11/2019</a:t>
+              <a:t>4/19/2019</a:t>
             </a:fld>
             <a:endParaRPr lang="en-US"/>
           </a:p>
@@ -1404,7 +1405,7 @@
           <a:p>
             <a:fld id="{9844EE4B-68D4-4DD6-916E-B6BD3677EE44}" type="datetimeFigureOut">
               <a:rPr lang="en-US" smtClean="0"/>
-              <a:t>4/11/2019</a:t>
+              <a:t>4/19/2019</a:t>
             </a:fld>
             <a:endParaRPr lang="en-US"/>
           </a:p>
@@ -1816,7 +1817,7 @@
           <a:p>
             <a:fld id="{9844EE4B-68D4-4DD6-916E-B6BD3677EE44}" type="datetimeFigureOut">
               <a:rPr lang="en-US" smtClean="0"/>
-              <a:t>4/11/2019</a:t>
+              <a:t>4/19/2019</a:t>
             </a:fld>
             <a:endParaRPr lang="en-US"/>
           </a:p>
@@ -1957,7 +1958,7 @@
           <a:p>
             <a:fld id="{9844EE4B-68D4-4DD6-916E-B6BD3677EE44}" type="datetimeFigureOut">
               <a:rPr lang="en-US" smtClean="0"/>
-              <a:t>4/11/2019</a:t>
+              <a:t>4/19/2019</a:t>
             </a:fld>
             <a:endParaRPr lang="en-US"/>
           </a:p>
@@ -2070,7 +2071,7 @@
           <a:p>
             <a:fld id="{9844EE4B-68D4-4DD6-916E-B6BD3677EE44}" type="datetimeFigureOut">
               <a:rPr lang="en-US" smtClean="0"/>
-              <a:t>4/11/2019</a:t>
+              <a:t>4/19/2019</a:t>
             </a:fld>
             <a:endParaRPr lang="en-US"/>
           </a:p>
@@ -2381,7 +2382,7 @@
           <a:p>
             <a:fld id="{9844EE4B-68D4-4DD6-916E-B6BD3677EE44}" type="datetimeFigureOut">
               <a:rPr lang="en-US" smtClean="0"/>
-              <a:t>4/11/2019</a:t>
+              <a:t>4/19/2019</a:t>
             </a:fld>
             <a:endParaRPr lang="en-US"/>
           </a:p>
@@ -2669,7 +2670,7 @@
           <a:p>
             <a:fld id="{9844EE4B-68D4-4DD6-916E-B6BD3677EE44}" type="datetimeFigureOut">
               <a:rPr lang="en-US" smtClean="0"/>
-              <a:t>4/11/2019</a:t>
+              <a:t>4/19/2019</a:t>
             </a:fld>
             <a:endParaRPr lang="en-US"/>
           </a:p>
@@ -2910,7 +2911,7 @@
           <a:p>
             <a:fld id="{9844EE4B-68D4-4DD6-916E-B6BD3677EE44}" type="datetimeFigureOut">
               <a:rPr lang="en-US" smtClean="0"/>
-              <a:t>4/11/2019</a:t>
+              <a:t>4/19/2019</a:t>
             </a:fld>
             <a:endParaRPr lang="en-US"/>
           </a:p>
@@ -4784,6 +4785,1046 @@
 </p:sld>
 </file>
 
+<file path=ppt/slides/slide3.xml><?xml version="1.0" encoding="utf-8"?>
+<p:sld xmlns:a="http://schemas.openxmlformats.org/drawingml/2006/main" xmlns:r="http://schemas.openxmlformats.org/officeDocument/2006/relationships" xmlns:p="http://schemas.openxmlformats.org/presentationml/2006/main">
+  <p:cSld>
+    <p:spTree>
+      <p:nvGrpSpPr>
+        <p:cNvPr id="1" name=""/>
+        <p:cNvGrpSpPr/>
+        <p:nvPr/>
+      </p:nvGrpSpPr>
+      <p:grpSpPr>
+        <a:xfrm>
+          <a:off x="0" y="0"/>
+          <a:ext cx="0" cy="0"/>
+          <a:chOff x="0" y="0"/>
+          <a:chExt cx="0" cy="0"/>
+        </a:xfrm>
+      </p:grpSpPr>
+      <p:sp>
+        <p:nvSpPr>
+          <p:cNvPr id="2" name="Rectangle: Rounded Corners 1">
+            <a:extLst>
+              <a:ext uri="{FF2B5EF4-FFF2-40B4-BE49-F238E27FC236}">
+                <a16:creationId xmlns:a16="http://schemas.microsoft.com/office/drawing/2014/main" id="{8851C615-16A0-4AE5-86AC-D9FCD2A4A519}"/>
+              </a:ext>
+            </a:extLst>
+          </p:cNvPr>
+          <p:cNvSpPr/>
+          <p:nvPr/>
+        </p:nvSpPr>
+        <p:spPr>
+          <a:xfrm>
+            <a:off x="245097" y="977241"/>
+            <a:ext cx="8012783" cy="2067615"/>
+          </a:xfrm>
+          <a:prstGeom prst="roundRect">
+            <a:avLst/>
+          </a:prstGeom>
+          <a:solidFill>
+            <a:schemeClr val="accent1">
+              <a:lumMod val="20000"/>
+              <a:lumOff val="80000"/>
+            </a:schemeClr>
+          </a:solidFill>
+          <a:ln w="38100"/>
+        </p:spPr>
+        <p:style>
+          <a:lnRef idx="2">
+            <a:schemeClr val="accent1">
+              <a:shade val="50000"/>
+            </a:schemeClr>
+          </a:lnRef>
+          <a:fillRef idx="1">
+            <a:schemeClr val="accent1"/>
+          </a:fillRef>
+          <a:effectRef idx="0">
+            <a:schemeClr val="accent1"/>
+          </a:effectRef>
+          <a:fontRef idx="minor">
+            <a:schemeClr val="lt1"/>
+          </a:fontRef>
+        </p:style>
+        <p:txBody>
+          <a:bodyPr rtlCol="0" anchor="ctr"/>
+          <a:lstStyle/>
+          <a:p>
+            <a:pPr algn="ctr"/>
+            <a:endParaRPr lang="en-US" dirty="0"/>
+          </a:p>
+        </p:txBody>
+      </p:sp>
+      <p:sp>
+        <p:nvSpPr>
+          <p:cNvPr id="3" name="Rectangle: Rounded Corners 2">
+            <a:extLst>
+              <a:ext uri="{FF2B5EF4-FFF2-40B4-BE49-F238E27FC236}">
+                <a16:creationId xmlns:a16="http://schemas.microsoft.com/office/drawing/2014/main" id="{B4455FCD-C079-4FC7-959F-974C71A77566}"/>
+              </a:ext>
+            </a:extLst>
+          </p:cNvPr>
+          <p:cNvSpPr/>
+          <p:nvPr/>
+        </p:nvSpPr>
+        <p:spPr>
+          <a:xfrm>
+            <a:off x="245096" y="3844556"/>
+            <a:ext cx="8012783" cy="2078617"/>
+          </a:xfrm>
+          <a:prstGeom prst="roundRect">
+            <a:avLst/>
+          </a:prstGeom>
+          <a:solidFill>
+            <a:schemeClr val="accent4">
+              <a:lumMod val="20000"/>
+              <a:lumOff val="80000"/>
+            </a:schemeClr>
+          </a:solidFill>
+          <a:ln w="38100">
+            <a:solidFill>
+              <a:schemeClr val="accent4">
+                <a:lumMod val="75000"/>
+              </a:schemeClr>
+            </a:solidFill>
+          </a:ln>
+        </p:spPr>
+        <p:style>
+          <a:lnRef idx="2">
+            <a:schemeClr val="accent1">
+              <a:shade val="50000"/>
+            </a:schemeClr>
+          </a:lnRef>
+          <a:fillRef idx="1">
+            <a:schemeClr val="accent1"/>
+          </a:fillRef>
+          <a:effectRef idx="0">
+            <a:schemeClr val="accent1"/>
+          </a:effectRef>
+          <a:fontRef idx="minor">
+            <a:schemeClr val="lt1"/>
+          </a:fontRef>
+        </p:style>
+        <p:txBody>
+          <a:bodyPr rtlCol="0" anchor="ctr"/>
+          <a:lstStyle/>
+          <a:p>
+            <a:pPr algn="ctr"/>
+            <a:endParaRPr lang="en-US"/>
+          </a:p>
+        </p:txBody>
+      </p:sp>
+      <p:sp>
+        <p:nvSpPr>
+          <p:cNvPr id="4" name="Rectangle: Rounded Corners 3">
+            <a:extLst>
+              <a:ext uri="{FF2B5EF4-FFF2-40B4-BE49-F238E27FC236}">
+                <a16:creationId xmlns:a16="http://schemas.microsoft.com/office/drawing/2014/main" id="{B7103ACA-5278-4E5B-A662-91DE26F1B318}"/>
+              </a:ext>
+            </a:extLst>
+          </p:cNvPr>
+          <p:cNvSpPr/>
+          <p:nvPr/>
+        </p:nvSpPr>
+        <p:spPr>
+          <a:xfrm>
+            <a:off x="942682" y="977241"/>
+            <a:ext cx="7315200" cy="2067615"/>
+          </a:xfrm>
+          <a:prstGeom prst="roundRect">
+            <a:avLst/>
+          </a:prstGeom>
+          <a:solidFill>
+            <a:schemeClr val="bg1"/>
+          </a:solidFill>
+          <a:ln w="38100"/>
+        </p:spPr>
+        <p:style>
+          <a:lnRef idx="2">
+            <a:schemeClr val="accent1">
+              <a:shade val="50000"/>
+            </a:schemeClr>
+          </a:lnRef>
+          <a:fillRef idx="1">
+            <a:schemeClr val="accent1"/>
+          </a:fillRef>
+          <a:effectRef idx="0">
+            <a:schemeClr val="accent1"/>
+          </a:effectRef>
+          <a:fontRef idx="minor">
+            <a:schemeClr val="lt1"/>
+          </a:fontRef>
+        </p:style>
+        <p:txBody>
+          <a:bodyPr rtlCol="0" anchor="ctr"/>
+          <a:lstStyle/>
+          <a:p>
+            <a:pPr algn="ctr"/>
+            <a:endParaRPr lang="en-US"/>
+          </a:p>
+        </p:txBody>
+      </p:sp>
+      <p:sp>
+        <p:nvSpPr>
+          <p:cNvPr id="5" name="Rectangle: Rounded Corners 4">
+            <a:extLst>
+              <a:ext uri="{FF2B5EF4-FFF2-40B4-BE49-F238E27FC236}">
+                <a16:creationId xmlns:a16="http://schemas.microsoft.com/office/drawing/2014/main" id="{D7520ACC-BF5B-4235-B42D-35C30830890C}"/>
+              </a:ext>
+            </a:extLst>
+          </p:cNvPr>
+          <p:cNvSpPr/>
+          <p:nvPr/>
+        </p:nvSpPr>
+        <p:spPr>
+          <a:xfrm>
+            <a:off x="942682" y="3855557"/>
+            <a:ext cx="7315200" cy="2067615"/>
+          </a:xfrm>
+          <a:prstGeom prst="roundRect">
+            <a:avLst/>
+          </a:prstGeom>
+          <a:solidFill>
+            <a:schemeClr val="bg1"/>
+          </a:solidFill>
+          <a:ln w="38100">
+            <a:solidFill>
+              <a:schemeClr val="accent4">
+                <a:lumMod val="75000"/>
+              </a:schemeClr>
+            </a:solidFill>
+          </a:ln>
+        </p:spPr>
+        <p:style>
+          <a:lnRef idx="2">
+            <a:schemeClr val="accent1">
+              <a:shade val="50000"/>
+            </a:schemeClr>
+          </a:lnRef>
+          <a:fillRef idx="1">
+            <a:schemeClr val="accent1"/>
+          </a:fillRef>
+          <a:effectRef idx="0">
+            <a:schemeClr val="accent1"/>
+          </a:effectRef>
+          <a:fontRef idx="minor">
+            <a:schemeClr val="lt1"/>
+          </a:fontRef>
+        </p:style>
+        <p:txBody>
+          <a:bodyPr rtlCol="0" anchor="ctr"/>
+          <a:lstStyle/>
+          <a:p>
+            <a:pPr algn="ctr"/>
+            <a:endParaRPr lang="en-US"/>
+          </a:p>
+        </p:txBody>
+      </p:sp>
+      <p:sp>
+        <p:nvSpPr>
+          <p:cNvPr id="6" name="TextBox 5">
+            <a:extLst>
+              <a:ext uri="{FF2B5EF4-FFF2-40B4-BE49-F238E27FC236}">
+                <a16:creationId xmlns:a16="http://schemas.microsoft.com/office/drawing/2014/main" id="{6565A650-90F8-4CE7-A2E3-1D9FDF46B47B}"/>
+              </a:ext>
+            </a:extLst>
+          </p:cNvPr>
+          <p:cNvSpPr txBox="1"/>
+          <p:nvPr/>
+        </p:nvSpPr>
+        <p:spPr>
+          <a:xfrm rot="16200000">
+            <a:off x="-428155" y="1687880"/>
+            <a:ext cx="2067617" cy="646331"/>
+          </a:xfrm>
+          <a:prstGeom prst="rect">
+            <a:avLst/>
+          </a:prstGeom>
+          <a:noFill/>
+        </p:spPr>
+        <p:txBody>
+          <a:bodyPr wrap="square" rtlCol="0">
+            <a:spAutoFit/>
+          </a:bodyPr>
+          <a:lstStyle/>
+          <a:p>
+            <a:pPr algn="ctr"/>
+            <a:r>
+              <a:rPr lang="en-US" sz="3600" dirty="0"/>
+              <a:t>Class</a:t>
+            </a:r>
+          </a:p>
+        </p:txBody>
+      </p:sp>
+      <p:sp>
+        <p:nvSpPr>
+          <p:cNvPr id="7" name="TextBox 6">
+            <a:extLst>
+              <a:ext uri="{FF2B5EF4-FFF2-40B4-BE49-F238E27FC236}">
+                <a16:creationId xmlns:a16="http://schemas.microsoft.com/office/drawing/2014/main" id="{CBE48B39-9985-4C8E-B5A4-B0350040ACF6}"/>
+              </a:ext>
+            </a:extLst>
+          </p:cNvPr>
+          <p:cNvSpPr txBox="1"/>
+          <p:nvPr/>
+        </p:nvSpPr>
+        <p:spPr>
+          <a:xfrm rot="16200000">
+            <a:off x="-426586" y="4555199"/>
+            <a:ext cx="2067616" cy="646331"/>
+          </a:xfrm>
+          <a:prstGeom prst="rect">
+            <a:avLst/>
+          </a:prstGeom>
+          <a:noFill/>
+        </p:spPr>
+        <p:txBody>
+          <a:bodyPr wrap="square" rtlCol="0">
+            <a:spAutoFit/>
+          </a:bodyPr>
+          <a:lstStyle/>
+          <a:p>
+            <a:pPr algn="ctr"/>
+            <a:r>
+              <a:rPr lang="en-US" sz="3600" dirty="0"/>
+              <a:t>Object</a:t>
+            </a:r>
+          </a:p>
+        </p:txBody>
+      </p:sp>
+      <p:sp>
+        <p:nvSpPr>
+          <p:cNvPr id="10" name="TextBox 9">
+            <a:extLst>
+              <a:ext uri="{FF2B5EF4-FFF2-40B4-BE49-F238E27FC236}">
+                <a16:creationId xmlns:a16="http://schemas.microsoft.com/office/drawing/2014/main" id="{CBCEC8F8-4B47-4921-8A49-BACE5793BFBF}"/>
+              </a:ext>
+            </a:extLst>
+          </p:cNvPr>
+          <p:cNvSpPr txBox="1"/>
+          <p:nvPr/>
+        </p:nvSpPr>
+        <p:spPr>
+          <a:xfrm>
+            <a:off x="1079652" y="2360609"/>
+            <a:ext cx="2194560" cy="615553"/>
+          </a:xfrm>
+          <a:prstGeom prst="rect">
+            <a:avLst/>
+          </a:prstGeom>
+          <a:noFill/>
+        </p:spPr>
+        <p:txBody>
+          <a:bodyPr wrap="square" rtlCol="0">
+            <a:spAutoFit/>
+          </a:bodyPr>
+          <a:lstStyle/>
+          <a:p>
+            <a:pPr algn="ctr"/>
+            <a:r>
+              <a:rPr lang="en-US" sz="2000" dirty="0"/>
+              <a:t>House</a:t>
+            </a:r>
+          </a:p>
+          <a:p>
+            <a:pPr algn="ctr"/>
+            <a:r>
+              <a:rPr lang="en-US" sz="1400" i="1" dirty="0">
+                <a:solidFill>
+                  <a:schemeClr val="tx2"/>
+                </a:solidFill>
+              </a:rPr>
+              <a:t>class</a:t>
+            </a:r>
+          </a:p>
+        </p:txBody>
+      </p:sp>
+      <p:sp>
+        <p:nvSpPr>
+          <p:cNvPr id="11" name="TextBox 10">
+            <a:extLst>
+              <a:ext uri="{FF2B5EF4-FFF2-40B4-BE49-F238E27FC236}">
+                <a16:creationId xmlns:a16="http://schemas.microsoft.com/office/drawing/2014/main" id="{7953FAFF-D855-44F3-A240-325A33D14D8F}"/>
+              </a:ext>
+            </a:extLst>
+          </p:cNvPr>
+          <p:cNvSpPr txBox="1"/>
+          <p:nvPr/>
+        </p:nvSpPr>
+        <p:spPr>
+          <a:xfrm>
+            <a:off x="3493579" y="2360608"/>
+            <a:ext cx="2194560" cy="615553"/>
+          </a:xfrm>
+          <a:prstGeom prst="rect">
+            <a:avLst/>
+          </a:prstGeom>
+          <a:noFill/>
+        </p:spPr>
+        <p:txBody>
+          <a:bodyPr wrap="square" rtlCol="0">
+            <a:spAutoFit/>
+          </a:bodyPr>
+          <a:lstStyle/>
+          <a:p>
+            <a:pPr algn="ctr"/>
+            <a:r>
+              <a:rPr lang="en-US" sz="2000" dirty="0"/>
+              <a:t>Dog</a:t>
+            </a:r>
+          </a:p>
+          <a:p>
+            <a:pPr algn="ctr"/>
+            <a:r>
+              <a:rPr lang="en-US" sz="1400" i="1" dirty="0">
+                <a:solidFill>
+                  <a:schemeClr val="tx2"/>
+                </a:solidFill>
+              </a:rPr>
+              <a:t>class</a:t>
+            </a:r>
+          </a:p>
+        </p:txBody>
+      </p:sp>
+      <p:sp>
+        <p:nvSpPr>
+          <p:cNvPr id="12" name="TextBox 11">
+            <a:extLst>
+              <a:ext uri="{FF2B5EF4-FFF2-40B4-BE49-F238E27FC236}">
+                <a16:creationId xmlns:a16="http://schemas.microsoft.com/office/drawing/2014/main" id="{D14CF7D3-5D2C-4ABA-BA36-2BBB0E510751}"/>
+              </a:ext>
+            </a:extLst>
+          </p:cNvPr>
+          <p:cNvSpPr txBox="1"/>
+          <p:nvPr/>
+        </p:nvSpPr>
+        <p:spPr>
+          <a:xfrm>
+            <a:off x="5898983" y="2360608"/>
+            <a:ext cx="2194560" cy="615553"/>
+          </a:xfrm>
+          <a:prstGeom prst="rect">
+            <a:avLst/>
+          </a:prstGeom>
+          <a:noFill/>
+        </p:spPr>
+        <p:txBody>
+          <a:bodyPr wrap="square" rtlCol="0">
+            <a:spAutoFit/>
+          </a:bodyPr>
+          <a:lstStyle/>
+          <a:p>
+            <a:pPr algn="ctr"/>
+            <a:r>
+              <a:rPr lang="en-US" sz="2000" dirty="0"/>
+              <a:t>Car</a:t>
+            </a:r>
+          </a:p>
+          <a:p>
+            <a:pPr algn="ctr"/>
+            <a:r>
+              <a:rPr lang="en-US" sz="1400" i="1" dirty="0">
+                <a:solidFill>
+                  <a:schemeClr val="tx2"/>
+                </a:solidFill>
+              </a:rPr>
+              <a:t>class</a:t>
+            </a:r>
+          </a:p>
+        </p:txBody>
+      </p:sp>
+      <p:sp>
+        <p:nvSpPr>
+          <p:cNvPr id="20" name="TextBox 19">
+            <a:extLst>
+              <a:ext uri="{FF2B5EF4-FFF2-40B4-BE49-F238E27FC236}">
+                <a16:creationId xmlns:a16="http://schemas.microsoft.com/office/drawing/2014/main" id="{33A0A46A-401C-4DC1-9B89-517B8259E674}"/>
+              </a:ext>
+            </a:extLst>
+          </p:cNvPr>
+          <p:cNvSpPr txBox="1"/>
+          <p:nvPr/>
+        </p:nvSpPr>
+        <p:spPr>
+          <a:xfrm>
+            <a:off x="1045717" y="5295300"/>
+            <a:ext cx="2194560" cy="615553"/>
+          </a:xfrm>
+          <a:prstGeom prst="rect">
+            <a:avLst/>
+          </a:prstGeom>
+          <a:noFill/>
+        </p:spPr>
+        <p:txBody>
+          <a:bodyPr wrap="square" rtlCol="0">
+            <a:spAutoFit/>
+          </a:bodyPr>
+          <a:lstStyle/>
+          <a:p>
+            <a:pPr algn="ctr"/>
+            <a:r>
+              <a:rPr lang="en-US" sz="2000" dirty="0"/>
+              <a:t>The White House</a:t>
+            </a:r>
+          </a:p>
+          <a:p>
+            <a:pPr algn="ctr"/>
+            <a:r>
+              <a:rPr lang="en-US" sz="1400" i="1" dirty="0">
+                <a:solidFill>
+                  <a:schemeClr val="accent4">
+                    <a:lumMod val="75000"/>
+                  </a:schemeClr>
+                </a:solidFill>
+              </a:rPr>
+              <a:t>instance of </a:t>
+            </a:r>
+            <a:r>
+              <a:rPr lang="en-US" sz="1400" i="1" dirty="0">
+                <a:solidFill>
+                  <a:schemeClr val="accent1">
+                    <a:lumMod val="50000"/>
+                  </a:schemeClr>
+                </a:solidFill>
+              </a:rPr>
+              <a:t>House</a:t>
+            </a:r>
+          </a:p>
+        </p:txBody>
+      </p:sp>
+      <p:sp>
+        <p:nvSpPr>
+          <p:cNvPr id="28" name="TextBox 27">
+            <a:extLst>
+              <a:ext uri="{FF2B5EF4-FFF2-40B4-BE49-F238E27FC236}">
+                <a16:creationId xmlns:a16="http://schemas.microsoft.com/office/drawing/2014/main" id="{7C966585-37B7-4E2D-9464-4D57DB94D6DA}"/>
+              </a:ext>
+            </a:extLst>
+          </p:cNvPr>
+          <p:cNvSpPr txBox="1"/>
+          <p:nvPr/>
+        </p:nvSpPr>
+        <p:spPr>
+          <a:xfrm>
+            <a:off x="3493579" y="5294313"/>
+            <a:ext cx="2194560" cy="615553"/>
+          </a:xfrm>
+          <a:prstGeom prst="rect">
+            <a:avLst/>
+          </a:prstGeom>
+          <a:noFill/>
+        </p:spPr>
+        <p:txBody>
+          <a:bodyPr wrap="square" rtlCol="0">
+            <a:spAutoFit/>
+          </a:bodyPr>
+          <a:lstStyle/>
+          <a:p>
+            <a:pPr algn="ctr"/>
+            <a:r>
+              <a:rPr lang="en-US" sz="2000" dirty="0"/>
+              <a:t>Lassie</a:t>
+            </a:r>
+          </a:p>
+          <a:p>
+            <a:pPr algn="ctr"/>
+            <a:r>
+              <a:rPr lang="en-US" sz="1400" i="1" dirty="0">
+                <a:solidFill>
+                  <a:schemeClr val="accent4">
+                    <a:lumMod val="75000"/>
+                  </a:schemeClr>
+                </a:solidFill>
+              </a:rPr>
+              <a:t>instance of </a:t>
+            </a:r>
+            <a:r>
+              <a:rPr lang="en-US" sz="1400" i="1" dirty="0">
+                <a:solidFill>
+                  <a:schemeClr val="accent1">
+                    <a:lumMod val="50000"/>
+                  </a:schemeClr>
+                </a:solidFill>
+              </a:rPr>
+              <a:t>Dog</a:t>
+            </a:r>
+          </a:p>
+        </p:txBody>
+      </p:sp>
+      <p:pic>
+        <p:nvPicPr>
+          <p:cNvPr id="24" name="Graphic 23" descr="Dog">
+            <a:extLst>
+              <a:ext uri="{FF2B5EF4-FFF2-40B4-BE49-F238E27FC236}">
+                <a16:creationId xmlns:a16="http://schemas.microsoft.com/office/drawing/2014/main" id="{80EE78B9-76E7-45BD-8FC9-D7C0DB50875C}"/>
+              </a:ext>
+            </a:extLst>
+          </p:cNvPr>
+          <p:cNvPicPr>
+            <a:picLocks noChangeAspect="1"/>
+          </p:cNvPicPr>
+          <p:nvPr/>
+        </p:nvPicPr>
+        <p:blipFill rotWithShape="1">
+          <a:blip r:embed="rId2">
+            <a:extLst>
+              <a:ext uri="{28A0092B-C50C-407E-A947-70E740481C1C}">
+                <a14:useLocalDpi xmlns:a14="http://schemas.microsoft.com/office/drawing/2010/main" val="0"/>
+              </a:ext>
+              <a:ext uri="{96DAC541-7B7A-43D3-8B79-37D633B846F1}">
+                <asvg:svgBlip xmlns:asvg="http://schemas.microsoft.com/office/drawing/2016/SVG/main" r:embed="rId3"/>
+              </a:ext>
+            </a:extLst>
+          </a:blip>
+          <a:srcRect t="18910"/>
+          <a:stretch/>
+        </p:blipFill>
+        <p:spPr>
+          <a:xfrm flipH="1">
+            <a:off x="3686201" y="1140643"/>
+            <a:ext cx="1828800" cy="1482980"/>
+          </a:xfrm>
+          <a:prstGeom prst="rect">
+            <a:avLst/>
+          </a:prstGeom>
+        </p:spPr>
+      </p:pic>
+      <p:sp>
+        <p:nvSpPr>
+          <p:cNvPr id="44" name="TextBox 43">
+            <a:extLst>
+              <a:ext uri="{FF2B5EF4-FFF2-40B4-BE49-F238E27FC236}">
+                <a16:creationId xmlns:a16="http://schemas.microsoft.com/office/drawing/2014/main" id="{E11E59AF-9A7C-402C-B8B0-3F3312C64C2A}"/>
+              </a:ext>
+            </a:extLst>
+          </p:cNvPr>
+          <p:cNvSpPr txBox="1"/>
+          <p:nvPr/>
+        </p:nvSpPr>
+        <p:spPr>
+          <a:xfrm>
+            <a:off x="5841133" y="5315469"/>
+            <a:ext cx="2194560" cy="615553"/>
+          </a:xfrm>
+          <a:prstGeom prst="rect">
+            <a:avLst/>
+          </a:prstGeom>
+          <a:noFill/>
+        </p:spPr>
+        <p:txBody>
+          <a:bodyPr wrap="square" rtlCol="0">
+            <a:spAutoFit/>
+          </a:bodyPr>
+          <a:lstStyle/>
+          <a:p>
+            <a:pPr algn="ctr"/>
+            <a:r>
+              <a:rPr lang="en-US" sz="2000" dirty="0"/>
+              <a:t>Your car</a:t>
+            </a:r>
+          </a:p>
+          <a:p>
+            <a:pPr algn="ctr"/>
+            <a:r>
+              <a:rPr lang="en-US" sz="1400" i="1" dirty="0">
+                <a:solidFill>
+                  <a:schemeClr val="accent4">
+                    <a:lumMod val="75000"/>
+                  </a:schemeClr>
+                </a:solidFill>
+              </a:rPr>
+              <a:t>instance of </a:t>
+            </a:r>
+            <a:r>
+              <a:rPr lang="en-US" sz="1400" i="1" dirty="0">
+                <a:solidFill>
+                  <a:schemeClr val="accent1">
+                    <a:lumMod val="50000"/>
+                  </a:schemeClr>
+                </a:solidFill>
+              </a:rPr>
+              <a:t>Car</a:t>
+            </a:r>
+          </a:p>
+        </p:txBody>
+      </p:sp>
+      <p:sp>
+        <p:nvSpPr>
+          <p:cNvPr id="48" name="Arrow: Down 47">
+            <a:extLst>
+              <a:ext uri="{FF2B5EF4-FFF2-40B4-BE49-F238E27FC236}">
+                <a16:creationId xmlns:a16="http://schemas.microsoft.com/office/drawing/2014/main" id="{B1F4F759-355D-42F5-81FC-78CEB3ABCA21}"/>
+              </a:ext>
+            </a:extLst>
+          </p:cNvPr>
+          <p:cNvSpPr/>
+          <p:nvPr/>
+        </p:nvSpPr>
+        <p:spPr>
+          <a:xfrm>
+            <a:off x="1618550" y="3167406"/>
+            <a:ext cx="1097280" cy="548640"/>
+          </a:xfrm>
+          <a:prstGeom prst="downArrow">
+            <a:avLst/>
+          </a:prstGeom>
+          <a:solidFill>
+            <a:schemeClr val="accent3">
+              <a:lumMod val="20000"/>
+              <a:lumOff val="80000"/>
+            </a:schemeClr>
+          </a:solidFill>
+        </p:spPr>
+        <p:style>
+          <a:lnRef idx="2">
+            <a:schemeClr val="accent3">
+              <a:shade val="50000"/>
+            </a:schemeClr>
+          </a:lnRef>
+          <a:fillRef idx="1">
+            <a:schemeClr val="accent3"/>
+          </a:fillRef>
+          <a:effectRef idx="0">
+            <a:schemeClr val="accent3"/>
+          </a:effectRef>
+          <a:fontRef idx="minor">
+            <a:schemeClr val="lt1"/>
+          </a:fontRef>
+        </p:style>
+        <p:txBody>
+          <a:bodyPr rtlCol="0" anchor="ctr"/>
+          <a:lstStyle/>
+          <a:p>
+            <a:pPr algn="ctr"/>
+            <a:endParaRPr lang="en-US"/>
+          </a:p>
+        </p:txBody>
+      </p:sp>
+      <p:sp>
+        <p:nvSpPr>
+          <p:cNvPr id="49" name="Arrow: Down 48">
+            <a:extLst>
+              <a:ext uri="{FF2B5EF4-FFF2-40B4-BE49-F238E27FC236}">
+                <a16:creationId xmlns:a16="http://schemas.microsoft.com/office/drawing/2014/main" id="{44B57A4D-77BA-46D1-971F-A3200BACD56F}"/>
+              </a:ext>
+            </a:extLst>
+          </p:cNvPr>
+          <p:cNvSpPr/>
+          <p:nvPr/>
+        </p:nvSpPr>
+        <p:spPr>
+          <a:xfrm>
+            <a:off x="4034334" y="3167406"/>
+            <a:ext cx="1097280" cy="548640"/>
+          </a:xfrm>
+          <a:prstGeom prst="downArrow">
+            <a:avLst/>
+          </a:prstGeom>
+          <a:solidFill>
+            <a:schemeClr val="accent3">
+              <a:lumMod val="20000"/>
+              <a:lumOff val="80000"/>
+            </a:schemeClr>
+          </a:solidFill>
+        </p:spPr>
+        <p:style>
+          <a:lnRef idx="2">
+            <a:schemeClr val="accent3">
+              <a:shade val="50000"/>
+            </a:schemeClr>
+          </a:lnRef>
+          <a:fillRef idx="1">
+            <a:schemeClr val="accent3"/>
+          </a:fillRef>
+          <a:effectRef idx="0">
+            <a:schemeClr val="accent3"/>
+          </a:effectRef>
+          <a:fontRef idx="minor">
+            <a:schemeClr val="lt1"/>
+          </a:fontRef>
+        </p:style>
+        <p:txBody>
+          <a:bodyPr rtlCol="0" anchor="ctr"/>
+          <a:lstStyle/>
+          <a:p>
+            <a:pPr algn="ctr"/>
+            <a:endParaRPr lang="en-US"/>
+          </a:p>
+        </p:txBody>
+      </p:sp>
+      <p:sp>
+        <p:nvSpPr>
+          <p:cNvPr id="50" name="Arrow: Down 49">
+            <a:extLst>
+              <a:ext uri="{FF2B5EF4-FFF2-40B4-BE49-F238E27FC236}">
+                <a16:creationId xmlns:a16="http://schemas.microsoft.com/office/drawing/2014/main" id="{7F021542-41AF-4FAE-9679-2543E64EFBA8}"/>
+              </a:ext>
+            </a:extLst>
+          </p:cNvPr>
+          <p:cNvSpPr/>
+          <p:nvPr/>
+        </p:nvSpPr>
+        <p:spPr>
+          <a:xfrm>
+            <a:off x="6432118" y="3167406"/>
+            <a:ext cx="1097280" cy="548640"/>
+          </a:xfrm>
+          <a:prstGeom prst="downArrow">
+            <a:avLst/>
+          </a:prstGeom>
+          <a:solidFill>
+            <a:schemeClr val="accent3">
+              <a:lumMod val="20000"/>
+              <a:lumOff val="80000"/>
+            </a:schemeClr>
+          </a:solidFill>
+        </p:spPr>
+        <p:style>
+          <a:lnRef idx="2">
+            <a:schemeClr val="accent3">
+              <a:shade val="50000"/>
+            </a:schemeClr>
+          </a:lnRef>
+          <a:fillRef idx="1">
+            <a:schemeClr val="accent3"/>
+          </a:fillRef>
+          <a:effectRef idx="0">
+            <a:schemeClr val="accent3"/>
+          </a:effectRef>
+          <a:fontRef idx="minor">
+            <a:schemeClr val="lt1"/>
+          </a:fontRef>
+        </p:style>
+        <p:txBody>
+          <a:bodyPr rtlCol="0" anchor="ctr"/>
+          <a:lstStyle/>
+          <a:p>
+            <a:pPr algn="ctr"/>
+            <a:endParaRPr lang="en-US"/>
+          </a:p>
+        </p:txBody>
+      </p:sp>
+      <p:pic>
+        <p:nvPicPr>
+          <p:cNvPr id="13" name="Graphic 12" descr="Home">
+            <a:extLst>
+              <a:ext uri="{FF2B5EF4-FFF2-40B4-BE49-F238E27FC236}">
+                <a16:creationId xmlns:a16="http://schemas.microsoft.com/office/drawing/2014/main" id="{286D13A1-F723-4A4D-9525-8192CDCAAE14}"/>
+              </a:ext>
+            </a:extLst>
+          </p:cNvPr>
+          <p:cNvPicPr>
+            <a:picLocks noChangeAspect="1"/>
+          </p:cNvPicPr>
+          <p:nvPr/>
+        </p:nvPicPr>
+        <p:blipFill rotWithShape="1">
+          <a:blip r:embed="rId4">
+            <a:extLst>
+              <a:ext uri="{28A0092B-C50C-407E-A947-70E740481C1C}">
+                <a14:useLocalDpi xmlns:a14="http://schemas.microsoft.com/office/drawing/2010/main" val="0"/>
+              </a:ext>
+              <a:ext uri="{96DAC541-7B7A-43D3-8B79-37D633B846F1}">
+                <asvg:svgBlip xmlns:asvg="http://schemas.microsoft.com/office/drawing/2016/SVG/main" r:embed="rId5"/>
+              </a:ext>
+            </a:extLst>
+          </a:blip>
+          <a:srcRect t="7371"/>
+          <a:stretch/>
+        </p:blipFill>
+        <p:spPr>
+          <a:xfrm>
+            <a:off x="1252790" y="1055801"/>
+            <a:ext cx="1828800" cy="1365307"/>
+          </a:xfrm>
+          <a:prstGeom prst="rect">
+            <a:avLst/>
+          </a:prstGeom>
+        </p:spPr>
+      </p:pic>
+      <p:pic>
+        <p:nvPicPr>
+          <p:cNvPr id="17" name="Graphic 16" descr="Car">
+            <a:extLst>
+              <a:ext uri="{FF2B5EF4-FFF2-40B4-BE49-F238E27FC236}">
+                <a16:creationId xmlns:a16="http://schemas.microsoft.com/office/drawing/2014/main" id="{CD6D5FCC-0B4D-4404-82B8-773380533D88}"/>
+              </a:ext>
+            </a:extLst>
+          </p:cNvPr>
+          <p:cNvPicPr>
+            <a:picLocks noChangeAspect="1"/>
+          </p:cNvPicPr>
+          <p:nvPr/>
+        </p:nvPicPr>
+        <p:blipFill rotWithShape="1">
+          <a:blip r:embed="rId6">
+            <a:extLst>
+              <a:ext uri="{28A0092B-C50C-407E-A947-70E740481C1C}">
+                <a14:useLocalDpi xmlns:a14="http://schemas.microsoft.com/office/drawing/2010/main" val="0"/>
+              </a:ext>
+              <a:ext uri="{96DAC541-7B7A-43D3-8B79-37D633B846F1}">
+                <asvg:svgBlip xmlns:asvg="http://schemas.microsoft.com/office/drawing/2016/SVG/main" r:embed="rId7"/>
+              </a:ext>
+            </a:extLst>
+          </a:blip>
+          <a:srcRect t="23719"/>
+          <a:stretch/>
+        </p:blipFill>
+        <p:spPr>
+          <a:xfrm flipH="1">
+            <a:off x="5974397" y="1140643"/>
+            <a:ext cx="2103122" cy="1728088"/>
+          </a:xfrm>
+          <a:prstGeom prst="rect">
+            <a:avLst/>
+          </a:prstGeom>
+        </p:spPr>
+      </p:pic>
+      <p:pic>
+        <p:nvPicPr>
+          <p:cNvPr id="23" name="Picture 22">
+            <a:extLst>
+              <a:ext uri="{FF2B5EF4-FFF2-40B4-BE49-F238E27FC236}">
+                <a16:creationId xmlns:a16="http://schemas.microsoft.com/office/drawing/2014/main" id="{ADB49106-9C59-426E-BAF8-26C031496A1F}"/>
+              </a:ext>
+            </a:extLst>
+          </p:cNvPr>
+          <p:cNvPicPr>
+            <a:picLocks noChangeAspect="1"/>
+          </p:cNvPicPr>
+          <p:nvPr/>
+        </p:nvPicPr>
+        <p:blipFill>
+          <a:blip r:embed="rId8">
+            <a:extLst>
+              <a:ext uri="{28A0092B-C50C-407E-A947-70E740481C1C}">
+                <a14:useLocalDpi xmlns:a14="http://schemas.microsoft.com/office/drawing/2010/main" val="0"/>
+              </a:ext>
+            </a:extLst>
+          </a:blip>
+          <a:stretch>
+            <a:fillRect/>
+          </a:stretch>
+        </p:blipFill>
+        <p:spPr>
+          <a:xfrm>
+            <a:off x="1296503" y="4150552"/>
+            <a:ext cx="1692988" cy="1188720"/>
+          </a:xfrm>
+          <a:prstGeom prst="rect">
+            <a:avLst/>
+          </a:prstGeom>
+          <a:ln>
+            <a:solidFill>
+              <a:schemeClr val="tx1">
+                <a:lumMod val="50000"/>
+                <a:lumOff val="50000"/>
+              </a:schemeClr>
+            </a:solidFill>
+          </a:ln>
+        </p:spPr>
+      </p:pic>
+      <p:pic>
+        <p:nvPicPr>
+          <p:cNvPr id="27" name="Picture 26">
+            <a:extLst>
+              <a:ext uri="{FF2B5EF4-FFF2-40B4-BE49-F238E27FC236}">
+                <a16:creationId xmlns:a16="http://schemas.microsoft.com/office/drawing/2014/main" id="{13C1B05E-513B-4885-AED2-B39E2B724FB0}"/>
+              </a:ext>
+            </a:extLst>
+          </p:cNvPr>
+          <p:cNvPicPr>
+            <a:picLocks noChangeAspect="1"/>
+          </p:cNvPicPr>
+          <p:nvPr/>
+        </p:nvPicPr>
+        <p:blipFill>
+          <a:blip r:embed="rId9">
+            <a:extLst>
+              <a:ext uri="{28A0092B-C50C-407E-A947-70E740481C1C}">
+                <a14:useLocalDpi xmlns:a14="http://schemas.microsoft.com/office/drawing/2010/main" val="0"/>
+              </a:ext>
+            </a:extLst>
+          </a:blip>
+          <a:stretch>
+            <a:fillRect/>
+          </a:stretch>
+        </p:blipFill>
+        <p:spPr>
+          <a:xfrm flipH="1">
+            <a:off x="3736480" y="4150552"/>
+            <a:ext cx="1692988" cy="1188720"/>
+          </a:xfrm>
+          <a:prstGeom prst="rect">
+            <a:avLst/>
+          </a:prstGeom>
+          <a:ln>
+            <a:solidFill>
+              <a:schemeClr val="tx1">
+                <a:lumMod val="50000"/>
+                <a:lumOff val="50000"/>
+              </a:schemeClr>
+            </a:solidFill>
+          </a:ln>
+        </p:spPr>
+      </p:pic>
+      <p:pic>
+        <p:nvPicPr>
+          <p:cNvPr id="31" name="Picture 30">
+            <a:extLst>
+              <a:ext uri="{FF2B5EF4-FFF2-40B4-BE49-F238E27FC236}">
+                <a16:creationId xmlns:a16="http://schemas.microsoft.com/office/drawing/2014/main" id="{5AFD1B98-A811-4B13-AE32-8BE1E4289996}"/>
+              </a:ext>
+            </a:extLst>
+          </p:cNvPr>
+          <p:cNvPicPr>
+            <a:picLocks noChangeAspect="1"/>
+          </p:cNvPicPr>
+          <p:nvPr/>
+        </p:nvPicPr>
+        <p:blipFill>
+          <a:blip r:embed="rId10">
+            <a:extLst>
+              <a:ext uri="{28A0092B-C50C-407E-A947-70E740481C1C}">
+                <a14:useLocalDpi xmlns:a14="http://schemas.microsoft.com/office/drawing/2010/main" val="0"/>
+              </a:ext>
+            </a:extLst>
+          </a:blip>
+          <a:stretch>
+            <a:fillRect/>
+          </a:stretch>
+        </p:blipFill>
+        <p:spPr>
+          <a:xfrm flipH="1">
+            <a:off x="6126238" y="4150552"/>
+            <a:ext cx="1692988" cy="1188720"/>
+          </a:xfrm>
+          <a:prstGeom prst="rect">
+            <a:avLst/>
+          </a:prstGeom>
+          <a:ln>
+            <a:solidFill>
+              <a:schemeClr val="tx1">
+                <a:lumMod val="50000"/>
+                <a:lumOff val="50000"/>
+              </a:schemeClr>
+            </a:solidFill>
+          </a:ln>
+        </p:spPr>
+      </p:pic>
+    </p:spTree>
+    <p:extLst>
+      <p:ext uri="{BB962C8B-B14F-4D97-AF65-F5344CB8AC3E}">
+        <p14:creationId xmlns:p14="http://schemas.microsoft.com/office/powerpoint/2010/main" val="422650190"/>
+      </p:ext>
+    </p:extLst>
+  </p:cSld>
+  <p:clrMapOvr>
+    <a:masterClrMapping/>
+  </p:clrMapOvr>
+</p:sld>
+</file>
+
 <file path=ppt/theme/theme1.xml><?xml version="1.0" encoding="utf-8"?>
 <a:theme xmlns:a="http://schemas.openxmlformats.org/drawingml/2006/main" name="Office Theme">
   <a:themeElements>

</xml_diff>

<commit_message>
improved VIS_000 and added cartopy teaser
</commit_message>
<xml_diff>
--- a/images/resources/resources.pptx
+++ b/images/resources/resources.pptx
@@ -8,6 +8,7 @@
     <p:sldId id="257" r:id="rId2"/>
     <p:sldId id="258" r:id="rId3"/>
     <p:sldId id="259" r:id="rId4"/>
+    <p:sldId id="260" r:id="rId5"/>
   </p:sldIdLst>
   <p:sldSz cx="12192000" cy="6858000"/>
   <p:notesSz cx="6858000" cy="9144000"/>
@@ -261,7 +262,7 @@
           <a:p>
             <a:fld id="{9844EE4B-68D4-4DD6-916E-B6BD3677EE44}" type="datetimeFigureOut">
               <a:rPr lang="en-US" smtClean="0"/>
-              <a:t>4/19/2019</a:t>
+              <a:t>4/20/2019</a:t>
             </a:fld>
             <a:endParaRPr lang="en-US"/>
           </a:p>
@@ -459,7 +460,7 @@
           <a:p>
             <a:fld id="{9844EE4B-68D4-4DD6-916E-B6BD3677EE44}" type="datetimeFigureOut">
               <a:rPr lang="en-US" smtClean="0"/>
-              <a:t>4/19/2019</a:t>
+              <a:t>4/20/2019</a:t>
             </a:fld>
             <a:endParaRPr lang="en-US"/>
           </a:p>
@@ -667,7 +668,7 @@
           <a:p>
             <a:fld id="{9844EE4B-68D4-4DD6-916E-B6BD3677EE44}" type="datetimeFigureOut">
               <a:rPr lang="en-US" smtClean="0"/>
-              <a:t>4/19/2019</a:t>
+              <a:t>4/20/2019</a:t>
             </a:fld>
             <a:endParaRPr lang="en-US"/>
           </a:p>
@@ -865,7 +866,7 @@
           <a:p>
             <a:fld id="{9844EE4B-68D4-4DD6-916E-B6BD3677EE44}" type="datetimeFigureOut">
               <a:rPr lang="en-US" smtClean="0"/>
-              <a:t>4/19/2019</a:t>
+              <a:t>4/20/2019</a:t>
             </a:fld>
             <a:endParaRPr lang="en-US"/>
           </a:p>
@@ -1140,7 +1141,7 @@
           <a:p>
             <a:fld id="{9844EE4B-68D4-4DD6-916E-B6BD3677EE44}" type="datetimeFigureOut">
               <a:rPr lang="en-US" smtClean="0"/>
-              <a:t>4/19/2019</a:t>
+              <a:t>4/20/2019</a:t>
             </a:fld>
             <a:endParaRPr lang="en-US"/>
           </a:p>
@@ -1405,7 +1406,7 @@
           <a:p>
             <a:fld id="{9844EE4B-68D4-4DD6-916E-B6BD3677EE44}" type="datetimeFigureOut">
               <a:rPr lang="en-US" smtClean="0"/>
-              <a:t>4/19/2019</a:t>
+              <a:t>4/20/2019</a:t>
             </a:fld>
             <a:endParaRPr lang="en-US"/>
           </a:p>
@@ -1817,7 +1818,7 @@
           <a:p>
             <a:fld id="{9844EE4B-68D4-4DD6-916E-B6BD3677EE44}" type="datetimeFigureOut">
               <a:rPr lang="en-US" smtClean="0"/>
-              <a:t>4/19/2019</a:t>
+              <a:t>4/20/2019</a:t>
             </a:fld>
             <a:endParaRPr lang="en-US"/>
           </a:p>
@@ -1958,7 +1959,7 @@
           <a:p>
             <a:fld id="{9844EE4B-68D4-4DD6-916E-B6BD3677EE44}" type="datetimeFigureOut">
               <a:rPr lang="en-US" smtClean="0"/>
-              <a:t>4/19/2019</a:t>
+              <a:t>4/20/2019</a:t>
             </a:fld>
             <a:endParaRPr lang="en-US"/>
           </a:p>
@@ -2071,7 +2072,7 @@
           <a:p>
             <a:fld id="{9844EE4B-68D4-4DD6-916E-B6BD3677EE44}" type="datetimeFigureOut">
               <a:rPr lang="en-US" smtClean="0"/>
-              <a:t>4/19/2019</a:t>
+              <a:t>4/20/2019</a:t>
             </a:fld>
             <a:endParaRPr lang="en-US"/>
           </a:p>
@@ -2382,7 +2383,7 @@
           <a:p>
             <a:fld id="{9844EE4B-68D4-4DD6-916E-B6BD3677EE44}" type="datetimeFigureOut">
               <a:rPr lang="en-US" smtClean="0"/>
-              <a:t>4/19/2019</a:t>
+              <a:t>4/20/2019</a:t>
             </a:fld>
             <a:endParaRPr lang="en-US"/>
           </a:p>
@@ -2670,7 +2671,7 @@
           <a:p>
             <a:fld id="{9844EE4B-68D4-4DD6-916E-B6BD3677EE44}" type="datetimeFigureOut">
               <a:rPr lang="en-US" smtClean="0"/>
-              <a:t>4/19/2019</a:t>
+              <a:t>4/20/2019</a:t>
             </a:fld>
             <a:endParaRPr lang="en-US"/>
           </a:p>
@@ -2911,7 +2912,7 @@
           <a:p>
             <a:fld id="{9844EE4B-68D4-4DD6-916E-B6BD3677EE44}" type="datetimeFigureOut">
               <a:rPr lang="en-US" smtClean="0"/>
-              <a:t>4/19/2019</a:t>
+              <a:t>4/20/2019</a:t>
             </a:fld>
             <a:endParaRPr lang="en-US"/>
           </a:p>
@@ -5825,6 +5826,117 @@
 </p:sld>
 </file>
 
+<file path=ppt/slides/slide4.xml><?xml version="1.0" encoding="utf-8"?>
+<p:sld xmlns:a="http://schemas.openxmlformats.org/drawingml/2006/main" xmlns:r="http://schemas.openxmlformats.org/officeDocument/2006/relationships" xmlns:p="http://schemas.openxmlformats.org/presentationml/2006/main">
+  <p:cSld>
+    <p:spTree>
+      <p:nvGrpSpPr>
+        <p:cNvPr id="1" name=""/>
+        <p:cNvGrpSpPr/>
+        <p:nvPr/>
+      </p:nvGrpSpPr>
+      <p:grpSpPr>
+        <a:xfrm>
+          <a:off x="0" y="0"/>
+          <a:ext cx="0" cy="0"/>
+          <a:chOff x="0" y="0"/>
+          <a:chExt cx="0" cy="0"/>
+        </a:xfrm>
+      </p:grpSpPr>
+      <p:pic>
+        <p:nvPicPr>
+          <p:cNvPr id="3" name="Picture 2">
+            <a:extLst>
+              <a:ext uri="{FF2B5EF4-FFF2-40B4-BE49-F238E27FC236}">
+                <a16:creationId xmlns:a16="http://schemas.microsoft.com/office/drawing/2014/main" id="{A8E98406-9E61-46FF-AD40-65A1AFEEA976}"/>
+              </a:ext>
+            </a:extLst>
+          </p:cNvPr>
+          <p:cNvPicPr>
+            <a:picLocks noChangeAspect="1"/>
+          </p:cNvPicPr>
+          <p:nvPr/>
+        </p:nvPicPr>
+        <p:blipFill rotWithShape="1">
+          <a:blip r:embed="rId2">
+            <a:extLst>
+              <a:ext uri="{28A0092B-C50C-407E-A947-70E740481C1C}">
+                <a14:useLocalDpi xmlns:a14="http://schemas.microsoft.com/office/drawing/2010/main" val="0"/>
+              </a:ext>
+            </a:extLst>
+          </a:blip>
+          <a:srcRect l="12527" t="11247" r="10053" b="10215"/>
+          <a:stretch/>
+        </p:blipFill>
+        <p:spPr>
+          <a:xfrm>
+            <a:off x="197962" y="452487"/>
+            <a:ext cx="7277493" cy="3949832"/>
+          </a:xfrm>
+          <a:prstGeom prst="rect">
+            <a:avLst/>
+          </a:prstGeom>
+        </p:spPr>
+      </p:pic>
+      <p:sp>
+        <p:nvSpPr>
+          <p:cNvPr id="4" name="Arrow: Right 3">
+            <a:extLst>
+              <a:ext uri="{FF2B5EF4-FFF2-40B4-BE49-F238E27FC236}">
+                <a16:creationId xmlns:a16="http://schemas.microsoft.com/office/drawing/2014/main" id="{77F251E6-18B7-408A-BBE7-3106ECEFB750}"/>
+              </a:ext>
+            </a:extLst>
+          </p:cNvPr>
+          <p:cNvSpPr/>
+          <p:nvPr/>
+        </p:nvSpPr>
+        <p:spPr>
+          <a:xfrm rot="21070635">
+            <a:off x="2428305" y="731279"/>
+            <a:ext cx="1182557" cy="548640"/>
+          </a:xfrm>
+          <a:prstGeom prst="rightArrow">
+            <a:avLst/>
+          </a:prstGeom>
+        </p:spPr>
+        <p:style>
+          <a:lnRef idx="2">
+            <a:schemeClr val="accent4">
+              <a:shade val="50000"/>
+            </a:schemeClr>
+          </a:lnRef>
+          <a:fillRef idx="1">
+            <a:schemeClr val="accent4"/>
+          </a:fillRef>
+          <a:effectRef idx="0">
+            <a:schemeClr val="accent4"/>
+          </a:effectRef>
+          <a:fontRef idx="minor">
+            <a:schemeClr val="lt1"/>
+          </a:fontRef>
+        </p:style>
+        <p:txBody>
+          <a:bodyPr rtlCol="0" anchor="ctr"/>
+          <a:lstStyle/>
+          <a:p>
+            <a:pPr algn="ctr"/>
+            <a:endParaRPr lang="en-US"/>
+          </a:p>
+        </p:txBody>
+      </p:sp>
+    </p:spTree>
+    <p:extLst>
+      <p:ext uri="{BB962C8B-B14F-4D97-AF65-F5344CB8AC3E}">
+        <p14:creationId xmlns:p14="http://schemas.microsoft.com/office/powerpoint/2010/main" val="1738513680"/>
+      </p:ext>
+    </p:extLst>
+  </p:cSld>
+  <p:clrMapOvr>
+    <a:masterClrMapping/>
+  </p:clrMapOvr>
+</p:sld>
+</file>
+
 <file path=ppt/theme/theme1.xml><?xml version="1.0" encoding="utf-8"?>
 <a:theme xmlns:a="http://schemas.openxmlformats.org/drawingml/2006/main" name="Office Theme">
   <a:themeElements>

</xml_diff>